<commit_message>
json schema openai tests
</commit_message>
<xml_diff>
--- a/docs/sparnatural-presentation.pptx
+++ b/docs/sparnatural-presentation.pptx
@@ -5,7 +5,7 @@
     <p:sldMasterId id="2147483648" r:id="rId1"/>
   </p:sldMasterIdLst>
   <p:notesMasterIdLst>
-    <p:notesMasterId r:id="rId53"/>
+    <p:notesMasterId r:id="rId55"/>
   </p:notesMasterIdLst>
   <p:sldIdLst>
     <p:sldId id="256" r:id="rId4"/>
@@ -57,6 +57,8 @@
     <p:sldId id="302" r:id="rId50"/>
     <p:sldId id="303" r:id="rId51"/>
     <p:sldId id="304" r:id="rId52"/>
+    <p:sldId id="305" r:id="rId53"/>
+    <p:sldId id="306" r:id="rId54"/>
   </p:sldIdLst>
   <p:sldSz cx="12192000" cy="6858000"/>
   <p:notesSz cx="6858000" cy="9144000"/>
@@ -2281,7 +2283,7 @@
       </p:grpSpPr>
       <p:sp>
         <p:nvSpPr>
-          <p:cNvPr id="1001000473" name="Slide Image Placeholder 1"/>
+          <p:cNvPr id="344545451" name="Slide Image Placeholder 1"/>
           <p:cNvSpPr>
             <a:spLocks noChangeAspect="1" noGrp="1" noRot="1"/>
           </p:cNvSpPr>
@@ -2293,7 +2295,7 @@
       </p:sp>
       <p:sp>
         <p:nvSpPr>
-          <p:cNvPr id="1482805847" name="Notes Placeholder 2"/>
+          <p:cNvPr id="622133526" name="Notes Placeholder 2"/>
           <p:cNvSpPr>
             <a:spLocks noGrp="1"/>
           </p:cNvSpPr>
@@ -2315,7 +2317,7 @@
       </p:sp>
       <p:sp>
         <p:nvSpPr>
-          <p:cNvPr id="357256802" name="Slide Number Placeholder 3"/>
+          <p:cNvPr id="581813973" name="Slide Number Placeholder 3"/>
           <p:cNvSpPr>
             <a:spLocks noGrp="1"/>
           </p:cNvSpPr>
@@ -2331,7 +2333,7 @@
             <a:pPr>
               <a:defRPr/>
             </a:pPr>
-            <a:fld id="{ECB9C349-D747-EC9E-B027-CF084AD69365}" type="slidenum">
+            <a:fld id="{A1E8579D-098C-1266-B5A3-8F87B9CE8FC8}" type="slidenum">
               <a:rPr/>
               <a:t/>
             </a:fld>
@@ -2495,7 +2497,7 @@
             <a:pPr>
               <a:defRPr/>
             </a:pPr>
-            <a:fld id="{49C0D457-32B7-FF81-7CDD-5536AD363F8E}" type="slidenum">
+            <a:fld id="{49B5A8AA-1385-695B-8062-81466ECB355E}" type="slidenum">
               <a:rPr/>
               <a:t/>
             </a:fld>
@@ -2527,7 +2529,7 @@
       </p:grpSpPr>
       <p:sp>
         <p:nvSpPr>
-          <p:cNvPr id="661841117" name="Slide Image Placeholder 1"/>
+          <p:cNvPr id="1001000473" name="Slide Image Placeholder 1"/>
           <p:cNvSpPr>
             <a:spLocks noChangeAspect="1" noGrp="1" noRot="1"/>
           </p:cNvSpPr>
@@ -2539,7 +2541,7 @@
       </p:sp>
       <p:sp>
         <p:nvSpPr>
-          <p:cNvPr id="2050896228" name="Notes Placeholder 2"/>
+          <p:cNvPr id="1482805847" name="Notes Placeholder 2"/>
           <p:cNvSpPr>
             <a:spLocks noGrp="1"/>
           </p:cNvSpPr>
@@ -2561,7 +2563,7 @@
       </p:sp>
       <p:sp>
         <p:nvSpPr>
-          <p:cNvPr id="1042474713" name="Slide Number Placeholder 3"/>
+          <p:cNvPr id="357256802" name="Slide Number Placeholder 3"/>
           <p:cNvSpPr>
             <a:spLocks noGrp="1"/>
           </p:cNvSpPr>
@@ -2577,7 +2579,7 @@
             <a:pPr>
               <a:defRPr/>
             </a:pPr>
-            <a:fld id="{9A713D31-5F96-3F26-8F13-136C06B3AD55}" type="slidenum">
+            <a:fld id="{ECB9C349-D747-EC9E-B027-CF084AD69365}" type="slidenum">
               <a:rPr/>
               <a:t/>
             </a:fld>
@@ -2609,7 +2611,7 @@
       </p:grpSpPr>
       <p:sp>
         <p:nvSpPr>
-          <p:cNvPr id="549416333" name="Slide Image Placeholder 1"/>
+          <p:cNvPr id="2" name="Slide Image Placeholder 1"/>
           <p:cNvSpPr>
             <a:spLocks noChangeAspect="1" noGrp="1" noRot="1"/>
           </p:cNvSpPr>
@@ -2621,7 +2623,7 @@
       </p:sp>
       <p:sp>
         <p:nvSpPr>
-          <p:cNvPr id="2013994621" name="Notes Placeholder 2"/>
+          <p:cNvPr id="3" name="Notes Placeholder 2"/>
           <p:cNvSpPr>
             <a:spLocks noGrp="1"/>
           </p:cNvSpPr>
@@ -2643,7 +2645,7 @@
       </p:sp>
       <p:sp>
         <p:nvSpPr>
-          <p:cNvPr id="1785379803" name="Slide Number Placeholder 3"/>
+          <p:cNvPr id="4" name="Slide Number Placeholder 3"/>
           <p:cNvSpPr>
             <a:spLocks noGrp="1"/>
           </p:cNvSpPr>
@@ -2659,7 +2661,7 @@
             <a:pPr>
               <a:defRPr/>
             </a:pPr>
-            <a:fld id="{A7BEAB5D-D59D-546D-2AF1-485A2D281495}" type="slidenum">
+            <a:fld id="{49C0D457-32B7-FF81-7CDD-5536AD363F8E}" type="slidenum">
               <a:rPr/>
               <a:t/>
             </a:fld>
@@ -2691,7 +2693,7 @@
       </p:grpSpPr>
       <p:sp>
         <p:nvSpPr>
-          <p:cNvPr id="1796695217" name="Slide Image Placeholder 1"/>
+          <p:cNvPr id="661841117" name="Slide Image Placeholder 1"/>
           <p:cNvSpPr>
             <a:spLocks noChangeAspect="1" noGrp="1" noRot="1"/>
           </p:cNvSpPr>
@@ -2703,7 +2705,7 @@
       </p:sp>
       <p:sp>
         <p:nvSpPr>
-          <p:cNvPr id="1683210576" name="Notes Placeholder 2"/>
+          <p:cNvPr id="2050896228" name="Notes Placeholder 2"/>
           <p:cNvSpPr>
             <a:spLocks noGrp="1"/>
           </p:cNvSpPr>
@@ -2725,7 +2727,7 @@
       </p:sp>
       <p:sp>
         <p:nvSpPr>
-          <p:cNvPr id="1486585161" name="Slide Number Placeholder 3"/>
+          <p:cNvPr id="1042474713" name="Slide Number Placeholder 3"/>
           <p:cNvSpPr>
             <a:spLocks noGrp="1"/>
           </p:cNvSpPr>
@@ -2741,7 +2743,7 @@
             <a:pPr>
               <a:defRPr/>
             </a:pPr>
-            <a:fld id="{C37905EB-9A54-C0BA-4960-A226DAFFE2B7}" type="slidenum">
+            <a:fld id="{9A713D31-5F96-3F26-8F13-136C06B3AD55}" type="slidenum">
               <a:rPr/>
               <a:t/>
             </a:fld>
@@ -2773,7 +2775,7 @@
       </p:grpSpPr>
       <p:sp>
         <p:nvSpPr>
-          <p:cNvPr id="2" name="Slide Image Placeholder 1"/>
+          <p:cNvPr id="549416333" name="Slide Image Placeholder 1"/>
           <p:cNvSpPr>
             <a:spLocks noChangeAspect="1" noGrp="1" noRot="1"/>
           </p:cNvSpPr>
@@ -2785,7 +2787,7 @@
       </p:sp>
       <p:sp>
         <p:nvSpPr>
-          <p:cNvPr id="3" name="Notes Placeholder 2"/>
+          <p:cNvPr id="2013994621" name="Notes Placeholder 2"/>
           <p:cNvSpPr>
             <a:spLocks noGrp="1"/>
           </p:cNvSpPr>
@@ -2807,7 +2809,7 @@
       </p:sp>
       <p:sp>
         <p:nvSpPr>
-          <p:cNvPr id="4" name="Slide Number Placeholder 3"/>
+          <p:cNvPr id="1785379803" name="Slide Number Placeholder 3"/>
           <p:cNvSpPr>
             <a:spLocks noGrp="1"/>
           </p:cNvSpPr>
@@ -2823,7 +2825,7 @@
             <a:pPr>
               <a:defRPr/>
             </a:pPr>
-            <a:fld id="{81DE1AA8-9B36-A877-3BEE-670CE57B4C38}" type="slidenum">
+            <a:fld id="{A7BEAB5D-D59D-546D-2AF1-485A2D281495}" type="slidenum">
               <a:rPr/>
               <a:t/>
             </a:fld>
@@ -2855,7 +2857,7 @@
       </p:grpSpPr>
       <p:sp>
         <p:nvSpPr>
-          <p:cNvPr id="39456767" name="Slide Image Placeholder 1"/>
+          <p:cNvPr id="1796695217" name="Slide Image Placeholder 1"/>
           <p:cNvSpPr>
             <a:spLocks noChangeAspect="1" noGrp="1" noRot="1"/>
           </p:cNvSpPr>
@@ -2867,7 +2869,7 @@
       </p:sp>
       <p:sp>
         <p:nvSpPr>
-          <p:cNvPr id="528561591" name="Notes Placeholder 2"/>
+          <p:cNvPr id="1683210576" name="Notes Placeholder 2"/>
           <p:cNvSpPr>
             <a:spLocks noGrp="1"/>
           </p:cNvSpPr>
@@ -2889,7 +2891,7 @@
       </p:sp>
       <p:sp>
         <p:nvSpPr>
-          <p:cNvPr id="1146863939" name="Slide Number Placeholder 3"/>
+          <p:cNvPr id="1486585161" name="Slide Number Placeholder 3"/>
           <p:cNvSpPr>
             <a:spLocks noGrp="1"/>
           </p:cNvSpPr>
@@ -2905,7 +2907,7 @@
             <a:pPr>
               <a:defRPr/>
             </a:pPr>
-            <a:fld id="{2212588F-DBDD-8B1D-B70B-96F8AD39E534}" type="slidenum">
+            <a:fld id="{C37905EB-9A54-C0BA-4960-A226DAFFE2B7}" type="slidenum">
               <a:rPr/>
               <a:t/>
             </a:fld>
@@ -2937,7 +2939,7 @@
       </p:grpSpPr>
       <p:sp>
         <p:nvSpPr>
-          <p:cNvPr id="1090178859" name="Slide Image Placeholder 1"/>
+          <p:cNvPr id="2" name="Slide Image Placeholder 1"/>
           <p:cNvSpPr>
             <a:spLocks noChangeAspect="1" noGrp="1" noRot="1"/>
           </p:cNvSpPr>
@@ -2949,7 +2951,7 @@
       </p:sp>
       <p:sp>
         <p:nvSpPr>
-          <p:cNvPr id="1770776881" name="Notes Placeholder 2"/>
+          <p:cNvPr id="3" name="Notes Placeholder 2"/>
           <p:cNvSpPr>
             <a:spLocks noGrp="1"/>
           </p:cNvSpPr>
@@ -2971,7 +2973,7 @@
       </p:sp>
       <p:sp>
         <p:nvSpPr>
-          <p:cNvPr id="1031116976" name="Slide Number Placeholder 3"/>
+          <p:cNvPr id="4" name="Slide Number Placeholder 3"/>
           <p:cNvSpPr>
             <a:spLocks noGrp="1"/>
           </p:cNvSpPr>
@@ -2987,7 +2989,7 @@
             <a:pPr>
               <a:defRPr/>
             </a:pPr>
-            <a:fld id="{AD92C063-FAF0-D93E-E170-E2C57DD906EF}" type="slidenum">
+            <a:fld id="{81DE1AA8-9B36-A877-3BEE-670CE57B4C38}" type="slidenum">
               <a:rPr/>
               <a:t/>
             </a:fld>
@@ -3019,7 +3021,7 @@
       </p:grpSpPr>
       <p:sp>
         <p:nvSpPr>
-          <p:cNvPr id="84835994" name="Slide Image Placeholder 1"/>
+          <p:cNvPr id="39456767" name="Slide Image Placeholder 1"/>
           <p:cNvSpPr>
             <a:spLocks noChangeAspect="1" noGrp="1" noRot="1"/>
           </p:cNvSpPr>
@@ -3031,7 +3033,7 @@
       </p:sp>
       <p:sp>
         <p:nvSpPr>
-          <p:cNvPr id="1975204747" name="Notes Placeholder 2"/>
+          <p:cNvPr id="528561591" name="Notes Placeholder 2"/>
           <p:cNvSpPr>
             <a:spLocks noGrp="1"/>
           </p:cNvSpPr>
@@ -3053,7 +3055,7 @@
       </p:sp>
       <p:sp>
         <p:nvSpPr>
-          <p:cNvPr id="499300060" name="Slide Number Placeholder 3"/>
+          <p:cNvPr id="1146863939" name="Slide Number Placeholder 3"/>
           <p:cNvSpPr>
             <a:spLocks noGrp="1"/>
           </p:cNvSpPr>
@@ -3069,7 +3071,7 @@
             <a:pPr>
               <a:defRPr/>
             </a:pPr>
-            <a:fld id="{AC5DE39D-CCB5-1EFE-A9D8-3DD2AE107C78}" type="slidenum">
+            <a:fld id="{2212588F-DBDD-8B1D-B70B-96F8AD39E534}" type="slidenum">
               <a:rPr/>
               <a:t/>
             </a:fld>
@@ -3101,7 +3103,7 @@
       </p:grpSpPr>
       <p:sp>
         <p:nvSpPr>
-          <p:cNvPr id="2134756151" name="Slide Image Placeholder 1"/>
+          <p:cNvPr id="1090178859" name="Slide Image Placeholder 1"/>
           <p:cNvSpPr>
             <a:spLocks noChangeAspect="1" noGrp="1" noRot="1"/>
           </p:cNvSpPr>
@@ -3113,7 +3115,7 @@
       </p:sp>
       <p:sp>
         <p:nvSpPr>
-          <p:cNvPr id="931940540" name="Notes Placeholder 2"/>
+          <p:cNvPr id="1770776881" name="Notes Placeholder 2"/>
           <p:cNvSpPr>
             <a:spLocks noGrp="1"/>
           </p:cNvSpPr>
@@ -3135,7 +3137,7 @@
       </p:sp>
       <p:sp>
         <p:nvSpPr>
-          <p:cNvPr id="980635024" name="Slide Number Placeholder 3"/>
+          <p:cNvPr id="1031116976" name="Slide Number Placeholder 3"/>
           <p:cNvSpPr>
             <a:spLocks noGrp="1"/>
           </p:cNvSpPr>
@@ -3151,7 +3153,7 @@
             <a:pPr>
               <a:defRPr/>
             </a:pPr>
-            <a:fld id="{E897E10C-4ECC-4D7B-6148-AC1427BC3391}" type="slidenum">
+            <a:fld id="{AD92C063-FAF0-D93E-E170-E2C57DD906EF}" type="slidenum">
               <a:rPr/>
               <a:t/>
             </a:fld>
@@ -3183,7 +3185,7 @@
       </p:grpSpPr>
       <p:sp>
         <p:nvSpPr>
-          <p:cNvPr id="2" name="Slide Image Placeholder 1"/>
+          <p:cNvPr id="84835994" name="Slide Image Placeholder 1"/>
           <p:cNvSpPr>
             <a:spLocks noChangeAspect="1" noGrp="1" noRot="1"/>
           </p:cNvSpPr>
@@ -3195,7 +3197,7 @@
       </p:sp>
       <p:sp>
         <p:nvSpPr>
-          <p:cNvPr id="3" name="Notes Placeholder 2"/>
+          <p:cNvPr id="1975204747" name="Notes Placeholder 2"/>
           <p:cNvSpPr>
             <a:spLocks noGrp="1"/>
           </p:cNvSpPr>
@@ -3217,7 +3219,7 @@
       </p:sp>
       <p:sp>
         <p:nvSpPr>
-          <p:cNvPr id="4" name="Slide Number Placeholder 3"/>
+          <p:cNvPr id="499300060" name="Slide Number Placeholder 3"/>
           <p:cNvSpPr>
             <a:spLocks noGrp="1"/>
           </p:cNvSpPr>
@@ -3233,7 +3235,7 @@
             <a:pPr>
               <a:defRPr/>
             </a:pPr>
-            <a:fld id="{8EF1698B-579E-3CAA-FCB3-E1871912A579}" type="slidenum">
+            <a:fld id="{AC5DE39D-CCB5-1EFE-A9D8-3DD2AE107C78}" type="slidenum">
               <a:rPr/>
               <a:t/>
             </a:fld>
@@ -3347,7 +3349,7 @@
       </p:grpSpPr>
       <p:sp>
         <p:nvSpPr>
-          <p:cNvPr id="2101123338" name="Slide Image Placeholder 1"/>
+          <p:cNvPr id="2134756151" name="Slide Image Placeholder 1"/>
           <p:cNvSpPr>
             <a:spLocks noChangeAspect="1" noGrp="1" noRot="1"/>
           </p:cNvSpPr>
@@ -3359,7 +3361,7 @@
       </p:sp>
       <p:sp>
         <p:nvSpPr>
-          <p:cNvPr id="1022166458" name="Notes Placeholder 2"/>
+          <p:cNvPr id="931940540" name="Notes Placeholder 2"/>
           <p:cNvSpPr>
             <a:spLocks noGrp="1"/>
           </p:cNvSpPr>
@@ -3381,7 +3383,7 @@
       </p:sp>
       <p:sp>
         <p:nvSpPr>
-          <p:cNvPr id="1291041273" name="Slide Number Placeholder 3"/>
+          <p:cNvPr id="980635024" name="Slide Number Placeholder 3"/>
           <p:cNvSpPr>
             <a:spLocks noGrp="1"/>
           </p:cNvSpPr>
@@ -3397,7 +3399,7 @@
             <a:pPr>
               <a:defRPr/>
             </a:pPr>
-            <a:fld id="{957BDDB5-9F90-FBDE-96F7-727B7DF076B5}" type="slidenum">
+            <a:fld id="{E897E10C-4ECC-4D7B-6148-AC1427BC3391}" type="slidenum">
               <a:rPr/>
               <a:t/>
             </a:fld>
@@ -3429,7 +3431,7 @@
       </p:grpSpPr>
       <p:sp>
         <p:nvSpPr>
-          <p:cNvPr id="791494557" name="Slide Image Placeholder 1"/>
+          <p:cNvPr id="2" name="Slide Image Placeholder 1"/>
           <p:cNvSpPr>
             <a:spLocks noChangeAspect="1" noGrp="1" noRot="1"/>
           </p:cNvSpPr>
@@ -3441,7 +3443,7 @@
       </p:sp>
       <p:sp>
         <p:nvSpPr>
-          <p:cNvPr id="1826584463" name="Notes Placeholder 2"/>
+          <p:cNvPr id="3" name="Notes Placeholder 2"/>
           <p:cNvSpPr>
             <a:spLocks noGrp="1"/>
           </p:cNvSpPr>
@@ -3463,7 +3465,7 @@
       </p:sp>
       <p:sp>
         <p:nvSpPr>
-          <p:cNvPr id="187429354" name="Slide Number Placeholder 3"/>
+          <p:cNvPr id="4" name="Slide Number Placeholder 3"/>
           <p:cNvSpPr>
             <a:spLocks noGrp="1"/>
           </p:cNvSpPr>
@@ -3479,7 +3481,7 @@
             <a:pPr>
               <a:defRPr/>
             </a:pPr>
-            <a:fld id="{78EDC247-12D9-A58D-971F-AE26FA0B93F6}" type="slidenum">
+            <a:fld id="{8EF1698B-579E-3CAA-FCB3-E1871912A579}" type="slidenum">
               <a:rPr/>
               <a:t/>
             </a:fld>
@@ -3511,7 +3513,7 @@
       </p:grpSpPr>
       <p:sp>
         <p:nvSpPr>
-          <p:cNvPr id="1457385139" name="Slide Image Placeholder 1"/>
+          <p:cNvPr id="2101123338" name="Slide Image Placeholder 1"/>
           <p:cNvSpPr>
             <a:spLocks noChangeAspect="1" noGrp="1" noRot="1"/>
           </p:cNvSpPr>
@@ -3523,7 +3525,7 @@
       </p:sp>
       <p:sp>
         <p:nvSpPr>
-          <p:cNvPr id="1361488226" name="Notes Placeholder 2"/>
+          <p:cNvPr id="1022166458" name="Notes Placeholder 2"/>
           <p:cNvSpPr>
             <a:spLocks noGrp="1"/>
           </p:cNvSpPr>
@@ -3545,7 +3547,7 @@
       </p:sp>
       <p:sp>
         <p:nvSpPr>
-          <p:cNvPr id="1702819150" name="Slide Number Placeholder 3"/>
+          <p:cNvPr id="1291041273" name="Slide Number Placeholder 3"/>
           <p:cNvSpPr>
             <a:spLocks noGrp="1"/>
           </p:cNvSpPr>
@@ -3561,7 +3563,7 @@
             <a:pPr>
               <a:defRPr/>
             </a:pPr>
-            <a:fld id="{14A82582-AE27-7DE8-7CB7-757D52A19A08}" type="slidenum">
+            <a:fld id="{957BDDB5-9F90-FBDE-96F7-727B7DF076B5}" type="slidenum">
               <a:rPr/>
               <a:t/>
             </a:fld>
@@ -3593,7 +3595,7 @@
       </p:grpSpPr>
       <p:sp>
         <p:nvSpPr>
-          <p:cNvPr id="1432833750" name="Slide Image Placeholder 1"/>
+          <p:cNvPr id="791494557" name="Slide Image Placeholder 1"/>
           <p:cNvSpPr>
             <a:spLocks noChangeAspect="1" noGrp="1" noRot="1"/>
           </p:cNvSpPr>
@@ -3605,7 +3607,7 @@
       </p:sp>
       <p:sp>
         <p:nvSpPr>
-          <p:cNvPr id="1272655432" name="Notes Placeholder 2"/>
+          <p:cNvPr id="1826584463" name="Notes Placeholder 2"/>
           <p:cNvSpPr>
             <a:spLocks noGrp="1"/>
           </p:cNvSpPr>
@@ -3627,7 +3629,7 @@
       </p:sp>
       <p:sp>
         <p:nvSpPr>
-          <p:cNvPr id="339109426" name="Slide Number Placeholder 3"/>
+          <p:cNvPr id="187429354" name="Slide Number Placeholder 3"/>
           <p:cNvSpPr>
             <a:spLocks noGrp="1"/>
           </p:cNvSpPr>
@@ -3643,7 +3645,7 @@
             <a:pPr>
               <a:defRPr/>
             </a:pPr>
-            <a:fld id="{C3E3A76C-2DD5-B386-0046-7D0AEB58B50F}" type="slidenum">
+            <a:fld id="{78EDC247-12D9-A58D-971F-AE26FA0B93F6}" type="slidenum">
               <a:rPr/>
               <a:t/>
             </a:fld>
@@ -3675,7 +3677,7 @@
       </p:grpSpPr>
       <p:sp>
         <p:nvSpPr>
-          <p:cNvPr id="1566869512" name="Slide Image Placeholder 1"/>
+          <p:cNvPr id="1457385139" name="Slide Image Placeholder 1"/>
           <p:cNvSpPr>
             <a:spLocks noChangeAspect="1" noGrp="1" noRot="1"/>
           </p:cNvSpPr>
@@ -3687,7 +3689,7 @@
       </p:sp>
       <p:sp>
         <p:nvSpPr>
-          <p:cNvPr id="1927764283" name="Notes Placeholder 2"/>
+          <p:cNvPr id="1361488226" name="Notes Placeholder 2"/>
           <p:cNvSpPr>
             <a:spLocks noGrp="1"/>
           </p:cNvSpPr>
@@ -3709,7 +3711,7 @@
       </p:sp>
       <p:sp>
         <p:nvSpPr>
-          <p:cNvPr id="1843167843" name="Slide Number Placeholder 3"/>
+          <p:cNvPr id="1702819150" name="Slide Number Placeholder 3"/>
           <p:cNvSpPr>
             <a:spLocks noGrp="1"/>
           </p:cNvSpPr>
@@ -3725,7 +3727,7 @@
             <a:pPr>
               <a:defRPr/>
             </a:pPr>
-            <a:fld id="{97931194-636D-8F92-57FB-8A32E899A3BA}" type="slidenum">
+            <a:fld id="{14A82582-AE27-7DE8-7CB7-757D52A19A08}" type="slidenum">
               <a:rPr/>
               <a:t/>
             </a:fld>
@@ -3757,7 +3759,7 @@
       </p:grpSpPr>
       <p:sp>
         <p:nvSpPr>
-          <p:cNvPr id="1073081198" name="Slide Image Placeholder 1"/>
+          <p:cNvPr id="1432833750" name="Slide Image Placeholder 1"/>
           <p:cNvSpPr>
             <a:spLocks noChangeAspect="1" noGrp="1" noRot="1"/>
           </p:cNvSpPr>
@@ -3769,7 +3771,7 @@
       </p:sp>
       <p:sp>
         <p:nvSpPr>
-          <p:cNvPr id="376984053" name="Notes Placeholder 2"/>
+          <p:cNvPr id="1272655432" name="Notes Placeholder 2"/>
           <p:cNvSpPr>
             <a:spLocks noGrp="1"/>
           </p:cNvSpPr>
@@ -3791,7 +3793,7 @@
       </p:sp>
       <p:sp>
         <p:nvSpPr>
-          <p:cNvPr id="468180247" name="Slide Number Placeholder 3"/>
+          <p:cNvPr id="339109426" name="Slide Number Placeholder 3"/>
           <p:cNvSpPr>
             <a:spLocks noGrp="1"/>
           </p:cNvSpPr>
@@ -3807,7 +3809,7 @@
             <a:pPr>
               <a:defRPr/>
             </a:pPr>
-            <a:fld id="{093AFCE0-EDB9-E087-4C5B-7642492FAD98}" type="slidenum">
+            <a:fld id="{C3E3A76C-2DD5-B386-0046-7D0AEB58B50F}" type="slidenum">
               <a:rPr/>
               <a:t/>
             </a:fld>
@@ -3839,7 +3841,7 @@
       </p:grpSpPr>
       <p:sp>
         <p:nvSpPr>
-          <p:cNvPr id="2" name="Slide Image Placeholder 1"/>
+          <p:cNvPr id="1566869512" name="Slide Image Placeholder 1"/>
           <p:cNvSpPr>
             <a:spLocks noChangeAspect="1" noGrp="1" noRot="1"/>
           </p:cNvSpPr>
@@ -3851,7 +3853,7 @@
       </p:sp>
       <p:sp>
         <p:nvSpPr>
-          <p:cNvPr id="3" name="Notes Placeholder 2"/>
+          <p:cNvPr id="1927764283" name="Notes Placeholder 2"/>
           <p:cNvSpPr>
             <a:spLocks noGrp="1"/>
           </p:cNvSpPr>
@@ -3873,7 +3875,7 @@
       </p:sp>
       <p:sp>
         <p:nvSpPr>
-          <p:cNvPr id="4" name="Slide Number Placeholder 3"/>
+          <p:cNvPr id="1843167843" name="Slide Number Placeholder 3"/>
           <p:cNvSpPr>
             <a:spLocks noGrp="1"/>
           </p:cNvSpPr>
@@ -3889,7 +3891,7 @@
             <a:pPr>
               <a:defRPr/>
             </a:pPr>
-            <a:fld id="{2F4B915B-CFCC-5C05-0559-73EF93198F04}" type="slidenum">
+            <a:fld id="{97931194-636D-8F92-57FB-8A32E899A3BA}" type="slidenum">
               <a:rPr/>
               <a:t/>
             </a:fld>
@@ -3921,7 +3923,7 @@
       </p:grpSpPr>
       <p:sp>
         <p:nvSpPr>
-          <p:cNvPr id="1509537627" name="Slide Image Placeholder 1"/>
+          <p:cNvPr id="1073081198" name="Slide Image Placeholder 1"/>
           <p:cNvSpPr>
             <a:spLocks noChangeAspect="1" noGrp="1" noRot="1"/>
           </p:cNvSpPr>
@@ -3933,7 +3935,7 @@
       </p:sp>
       <p:sp>
         <p:nvSpPr>
-          <p:cNvPr id="1526287998" name="Notes Placeholder 2"/>
+          <p:cNvPr id="376984053" name="Notes Placeholder 2"/>
           <p:cNvSpPr>
             <a:spLocks noGrp="1"/>
           </p:cNvSpPr>
@@ -3955,7 +3957,7 @@
       </p:sp>
       <p:sp>
         <p:nvSpPr>
-          <p:cNvPr id="636600589" name="Slide Number Placeholder 3"/>
+          <p:cNvPr id="468180247" name="Slide Number Placeholder 3"/>
           <p:cNvSpPr>
             <a:spLocks noGrp="1"/>
           </p:cNvSpPr>
@@ -3971,7 +3973,7 @@
             <a:pPr>
               <a:defRPr/>
             </a:pPr>
-            <a:fld id="{C821F711-A802-77B3-96F2-370D110A64E5}" type="slidenum">
+            <a:fld id="{093AFCE0-EDB9-E087-4C5B-7642492FAD98}" type="slidenum">
               <a:rPr/>
               <a:t/>
             </a:fld>
@@ -4003,7 +4005,7 @@
       </p:grpSpPr>
       <p:sp>
         <p:nvSpPr>
-          <p:cNvPr id="437217661" name="Slide Image Placeholder 1"/>
+          <p:cNvPr id="2" name="Slide Image Placeholder 1"/>
           <p:cNvSpPr>
             <a:spLocks noChangeAspect="1" noGrp="1" noRot="1"/>
           </p:cNvSpPr>
@@ -4015,7 +4017,7 @@
       </p:sp>
       <p:sp>
         <p:nvSpPr>
-          <p:cNvPr id="1607481061" name="Notes Placeholder 2"/>
+          <p:cNvPr id="3" name="Notes Placeholder 2"/>
           <p:cNvSpPr>
             <a:spLocks noGrp="1"/>
           </p:cNvSpPr>
@@ -4037,7 +4039,7 @@
       </p:sp>
       <p:sp>
         <p:nvSpPr>
-          <p:cNvPr id="99081736" name="Slide Number Placeholder 3"/>
+          <p:cNvPr id="4" name="Slide Number Placeholder 3"/>
           <p:cNvSpPr>
             <a:spLocks noGrp="1"/>
           </p:cNvSpPr>
@@ -4053,7 +4055,7 @@
             <a:pPr>
               <a:defRPr/>
             </a:pPr>
-            <a:fld id="{1E537C34-235C-622C-FA73-8181EE24A4FB}" type="slidenum">
+            <a:fld id="{2F4B915B-CFCC-5C05-0559-73EF93198F04}" type="slidenum">
               <a:rPr/>
               <a:t/>
             </a:fld>
@@ -4085,7 +4087,7 @@
       </p:grpSpPr>
       <p:sp>
         <p:nvSpPr>
-          <p:cNvPr id="2005291464" name="Slide Image Placeholder 1"/>
+          <p:cNvPr id="1509537627" name="Slide Image Placeholder 1"/>
           <p:cNvSpPr>
             <a:spLocks noChangeAspect="1" noGrp="1" noRot="1"/>
           </p:cNvSpPr>
@@ -4097,7 +4099,7 @@
       </p:sp>
       <p:sp>
         <p:nvSpPr>
-          <p:cNvPr id="502584524" name="Notes Placeholder 2"/>
+          <p:cNvPr id="1526287998" name="Notes Placeholder 2"/>
           <p:cNvSpPr>
             <a:spLocks noGrp="1"/>
           </p:cNvSpPr>
@@ -4119,7 +4121,7 @@
       </p:sp>
       <p:sp>
         <p:nvSpPr>
-          <p:cNvPr id="149620603" name="Slide Number Placeholder 3"/>
+          <p:cNvPr id="636600589" name="Slide Number Placeholder 3"/>
           <p:cNvSpPr>
             <a:spLocks noGrp="1"/>
           </p:cNvSpPr>
@@ -4135,7 +4137,7 @@
             <a:pPr>
               <a:defRPr/>
             </a:pPr>
-            <a:fld id="{0884E859-E201-6D12-3D30-9D889C7E86B7}" type="slidenum">
+            <a:fld id="{C821F711-A802-77B3-96F2-370D110A64E5}" type="slidenum">
               <a:rPr/>
               <a:t/>
             </a:fld>
@@ -4218,6 +4220,170 @@
               <a:defRPr/>
             </a:pPr>
             <a:fld id="{1267E670-24BD-A571-FC09-62D529D55C38}" type="slidenum">
+              <a:rPr/>
+              <a:t/>
+            </a:fld>
+            <a:endParaRPr/>
+          </a:p>
+        </p:txBody>
+      </p:sp>
+    </p:spTree>
+  </p:cSld>
+</p:notes>
+</file>
+
+<file path=ppt/notesSlides/notesSlide50.xml><?xml version="1.0" encoding="utf-8"?>
+<p:notes xmlns:a="http://schemas.openxmlformats.org/drawingml/2006/main" xmlns:r="http://schemas.openxmlformats.org/officeDocument/2006/relationships" xmlns:p="http://schemas.openxmlformats.org/presentationml/2006/main" xmlns:m="http://schemas.openxmlformats.org/officeDocument/2006/math" xmlns:w="http://schemas.openxmlformats.org/wordprocessingml/2006/main">
+  <p:cSld name="">
+    <p:spTree>
+      <p:nvGrpSpPr>
+        <p:cNvPr id="1" name=""/>
+        <p:cNvGrpSpPr/>
+        <p:nvPr/>
+      </p:nvGrpSpPr>
+      <p:grpSpPr bwMode="auto">
+        <a:xfrm>
+          <a:off x="0" y="0"/>
+          <a:ext cx="0" cy="0"/>
+          <a:chOff x="0" y="0"/>
+          <a:chExt cx="0" cy="0"/>
+        </a:xfrm>
+      </p:grpSpPr>
+      <p:sp>
+        <p:nvSpPr>
+          <p:cNvPr id="437217661" name="Slide Image Placeholder 1"/>
+          <p:cNvSpPr>
+            <a:spLocks noChangeAspect="1" noGrp="1" noRot="1"/>
+          </p:cNvSpPr>
+          <p:nvPr>
+            <p:ph type="sldImg"/>
+          </p:nvPr>
+        </p:nvSpPr>
+        <p:spPr bwMode="auto"/>
+      </p:sp>
+      <p:sp>
+        <p:nvSpPr>
+          <p:cNvPr id="1607481061" name="Notes Placeholder 2"/>
+          <p:cNvSpPr>
+            <a:spLocks noGrp="1"/>
+          </p:cNvSpPr>
+          <p:nvPr>
+            <p:ph type="body" idx="1"/>
+          </p:nvPr>
+        </p:nvSpPr>
+        <p:spPr bwMode="auto"/>
+        <p:txBody>
+          <a:bodyPr/>
+          <a:lstStyle/>
+          <a:p>
+            <a:pPr>
+              <a:defRPr/>
+            </a:pPr>
+            <a:endParaRPr/>
+          </a:p>
+        </p:txBody>
+      </p:sp>
+      <p:sp>
+        <p:nvSpPr>
+          <p:cNvPr id="99081736" name="Slide Number Placeholder 3"/>
+          <p:cNvSpPr>
+            <a:spLocks noGrp="1"/>
+          </p:cNvSpPr>
+          <p:nvPr>
+            <p:ph type="sldNum" sz="quarter" idx="10"/>
+          </p:nvPr>
+        </p:nvSpPr>
+        <p:spPr bwMode="auto"/>
+        <p:txBody>
+          <a:bodyPr/>
+          <a:lstStyle/>
+          <a:p>
+            <a:pPr>
+              <a:defRPr/>
+            </a:pPr>
+            <a:fld id="{1E537C34-235C-622C-FA73-8181EE24A4FB}" type="slidenum">
+              <a:rPr/>
+              <a:t/>
+            </a:fld>
+            <a:endParaRPr/>
+          </a:p>
+        </p:txBody>
+      </p:sp>
+    </p:spTree>
+  </p:cSld>
+</p:notes>
+</file>
+
+<file path=ppt/notesSlides/notesSlide51.xml><?xml version="1.0" encoding="utf-8"?>
+<p:notes xmlns:a="http://schemas.openxmlformats.org/drawingml/2006/main" xmlns:r="http://schemas.openxmlformats.org/officeDocument/2006/relationships" xmlns:p="http://schemas.openxmlformats.org/presentationml/2006/main" xmlns:m="http://schemas.openxmlformats.org/officeDocument/2006/math" xmlns:w="http://schemas.openxmlformats.org/wordprocessingml/2006/main">
+  <p:cSld name="">
+    <p:spTree>
+      <p:nvGrpSpPr>
+        <p:cNvPr id="1" name=""/>
+        <p:cNvGrpSpPr/>
+        <p:nvPr/>
+      </p:nvGrpSpPr>
+      <p:grpSpPr bwMode="auto">
+        <a:xfrm>
+          <a:off x="0" y="0"/>
+          <a:ext cx="0" cy="0"/>
+          <a:chOff x="0" y="0"/>
+          <a:chExt cx="0" cy="0"/>
+        </a:xfrm>
+      </p:grpSpPr>
+      <p:sp>
+        <p:nvSpPr>
+          <p:cNvPr id="2005291464" name="Slide Image Placeholder 1"/>
+          <p:cNvSpPr>
+            <a:spLocks noChangeAspect="1" noGrp="1" noRot="1"/>
+          </p:cNvSpPr>
+          <p:nvPr>
+            <p:ph type="sldImg"/>
+          </p:nvPr>
+        </p:nvSpPr>
+        <p:spPr bwMode="auto"/>
+      </p:sp>
+      <p:sp>
+        <p:nvSpPr>
+          <p:cNvPr id="502584524" name="Notes Placeholder 2"/>
+          <p:cNvSpPr>
+            <a:spLocks noGrp="1"/>
+          </p:cNvSpPr>
+          <p:nvPr>
+            <p:ph type="body" idx="1"/>
+          </p:nvPr>
+        </p:nvSpPr>
+        <p:spPr bwMode="auto"/>
+        <p:txBody>
+          <a:bodyPr/>
+          <a:lstStyle/>
+          <a:p>
+            <a:pPr>
+              <a:defRPr/>
+            </a:pPr>
+            <a:endParaRPr/>
+          </a:p>
+        </p:txBody>
+      </p:sp>
+      <p:sp>
+        <p:nvSpPr>
+          <p:cNvPr id="149620603" name="Slide Number Placeholder 3"/>
+          <p:cNvSpPr>
+            <a:spLocks noGrp="1"/>
+          </p:cNvSpPr>
+          <p:nvPr>
+            <p:ph type="sldNum" sz="quarter" idx="10"/>
+          </p:nvPr>
+        </p:nvSpPr>
+        <p:spPr bwMode="auto"/>
+        <p:txBody>
+          <a:bodyPr/>
+          <a:lstStyle/>
+          <a:p>
+            <a:pPr>
+              <a:defRPr/>
+            </a:pPr>
+            <a:fld id="{0884E859-E201-6D12-3D30-9D889C7E86B7}" type="slidenum">
               <a:rPr/>
               <a:t/>
             </a:fld>
@@ -7831,7 +7997,7 @@
         <p:spPr bwMode="auto">
           <a:xfrm flipH="0" flipV="0">
             <a:off x="968778" y="743411"/>
-            <a:ext cx="10636331" cy="2286360"/>
+            <a:ext cx="10636330" cy="2286360"/>
           </a:xfrm>
           <a:prstGeom prst="rect">
             <a:avLst/>
@@ -8636,7 +8802,7 @@
         </p:nvSpPr>
         <p:spPr bwMode="auto">
           <a:xfrm flipH="0" flipV="0">
-            <a:off x="999684" y="4596043"/>
+            <a:off x="999683" y="4596043"/>
             <a:ext cx="10718498" cy="640440"/>
           </a:xfrm>
           <a:prstGeom prst="rect">
@@ -9348,7 +9514,7 @@
         <p:spPr bwMode="auto">
           <a:xfrm flipH="0" flipV="0">
             <a:off x="278373" y="2139813"/>
-            <a:ext cx="11471684" cy="2862135"/>
+            <a:ext cx="11471683" cy="2862135"/>
           </a:xfrm>
           <a:prstGeom prst="rect">
             <a:avLst/>
@@ -9520,14 +9686,14 @@
       </p:grpSpPr>
       <p:sp>
         <p:nvSpPr>
-          <p:cNvPr id="1532590741" name=""/>
+          <p:cNvPr id="2007513375" name=""/>
           <p:cNvSpPr txBox="1"/>
           <p:nvPr/>
         </p:nvSpPr>
         <p:spPr bwMode="auto">
           <a:xfrm flipH="0" flipV="0">
-            <a:off x="968778" y="743411"/>
-            <a:ext cx="10731731" cy="2286360"/>
+            <a:off x="968778" y="743410"/>
+            <a:ext cx="10734971" cy="3383639"/>
           </a:xfrm>
           <a:prstGeom prst="rect">
             <a:avLst/>
@@ -9551,7 +9717,7 @@
                 <a:ea typeface="Century Gothic"/>
                 <a:cs typeface="Century Gothic"/>
               </a:rPr>
-              <a:t>Easy colors customization</a:t>
+              <a:t>Sparnatural has its own query format (not SPARQL), in JSON</a:t>
             </a:r>
             <a:endParaRPr sz="7200">
               <a:latin typeface="Century Gothic"/>
@@ -9562,14 +9728,14 @@
       </p:sp>
       <p:sp>
         <p:nvSpPr>
-          <p:cNvPr id="1706395948" name=""/>
+          <p:cNvPr id="693244166" name=""/>
           <p:cNvSpPr txBox="1"/>
           <p:nvPr/>
         </p:nvSpPr>
         <p:spPr bwMode="auto">
           <a:xfrm flipH="0" flipV="0">
-            <a:off x="1082911" y="4031939"/>
-            <a:ext cx="8793312" cy="366119"/>
+            <a:off x="1129148" y="5095409"/>
+            <a:ext cx="8794391" cy="366119"/>
           </a:xfrm>
           <a:prstGeom prst="rect">
             <a:avLst/>
@@ -9585,8 +9751,20 @@
               <a:defRPr/>
             </a:pPr>
             <a:r>
+              <a:rPr lang="fr-FR" sz="1800" b="0" i="0" u="sng" strike="noStrike" cap="none" spc="0">
+                <a:solidFill>
+                  <a:schemeClr val="tx1"/>
+                </a:solidFill>
+                <a:latin typeface="Arial"/>
+                <a:ea typeface="Arial"/>
+                <a:cs typeface="Arial"/>
+                <a:hlinkClick r:id="rId3" tooltip="https://docs.sparnatural.eu/Query-JSON-format.html"/>
+              </a:rPr>
+              <a:t>https://docs.sparnatural.eu/Query-JSON-format.html</a:t>
+            </a:r>
+            <a:r>
               <a:rPr/>
-              <a:t>Theme CSS</a:t>
+              <a:t> </a:t>
             </a:r>
             <a:endParaRPr/>
           </a:p>
@@ -9722,6 +9900,168 @@
 </file>
 
 <file path=ppt/slides/slide30.xml><?xml version="1.0" encoding="utf-8"?>
+<p:sld xmlns:a="http://schemas.openxmlformats.org/drawingml/2006/main" xmlns:r="http://schemas.openxmlformats.org/officeDocument/2006/relationships" xmlns:p="http://schemas.openxmlformats.org/presentationml/2006/main" xmlns:m="http://schemas.openxmlformats.org/officeDocument/2006/math" xmlns:w="http://schemas.openxmlformats.org/wordprocessingml/2006/main" xmlns:mc="http://schemas.openxmlformats.org/markup-compatibility/2006" showMasterPhAnim="0" showMasterSp="1" show="1">
+  <p:cSld name="">
+    <p:spTree>
+      <p:nvGrpSpPr>
+        <p:cNvPr id="1" name=""/>
+        <p:cNvGrpSpPr/>
+        <p:nvPr/>
+      </p:nvGrpSpPr>
+      <p:grpSpPr bwMode="auto">
+        <a:xfrm>
+          <a:off x="0" y="0"/>
+          <a:ext cx="0" cy="0"/>
+          <a:chOff x="0" y="0"/>
+          <a:chExt cx="0" cy="0"/>
+        </a:xfrm>
+      </p:grpSpPr>
+      <p:pic>
+        <p:nvPicPr>
+          <p:cNvPr id="427244477" name=""/>
+          <p:cNvPicPr>
+            <a:picLocks noChangeAspect="1"/>
+          </p:cNvPicPr>
+          <p:nvPr/>
+        </p:nvPicPr>
+        <p:blipFill>
+          <a:blip r:embed="rId3"/>
+          <a:stretch/>
+        </p:blipFill>
+        <p:spPr bwMode="auto">
+          <a:xfrm flipH="0" flipV="0">
+            <a:off x="1929509" y="166456"/>
+            <a:ext cx="8040320" cy="6670367"/>
+          </a:xfrm>
+          <a:prstGeom prst="rect">
+            <a:avLst/>
+          </a:prstGeom>
+        </p:spPr>
+      </p:pic>
+    </p:spTree>
+  </p:cSld>
+  <p:clrMapOvr>
+    <a:masterClrMapping/>
+  </p:clrMapOvr>
+  <mc:AlternateContent xmlns:mc="http://schemas.openxmlformats.org/markup-compatibility/2006">
+    <mc:Choice xmlns:p159="http://schemas.microsoft.com/office/powerpoint/2015/09/main" xmlns:p14="http://schemas.microsoft.com/office/powerpoint/2010/main" Requires="p159">
+      <p:transition p14:dur="2000" advClick="1"/>
+    </mc:Choice>
+    <mc:Fallback>
+      <p:transition advClick="1"/>
+    </mc:Fallback>
+  </mc:AlternateContent>
+</p:sld>
+</file>
+
+<file path=ppt/slides/slide31.xml><?xml version="1.0" encoding="utf-8"?>
+<p:sld xmlns:a="http://schemas.openxmlformats.org/drawingml/2006/main" xmlns:r="http://schemas.openxmlformats.org/officeDocument/2006/relationships" xmlns:p="http://schemas.openxmlformats.org/presentationml/2006/main" xmlns:m="http://schemas.openxmlformats.org/officeDocument/2006/math" xmlns:w="http://schemas.openxmlformats.org/wordprocessingml/2006/main" xmlns:mc="http://schemas.openxmlformats.org/markup-compatibility/2006" showMasterPhAnim="0" showMasterSp="1" show="1">
+  <p:cSld name="">
+    <p:spTree>
+      <p:nvGrpSpPr>
+        <p:cNvPr id="1" name=""/>
+        <p:cNvGrpSpPr/>
+        <p:nvPr/>
+      </p:nvGrpSpPr>
+      <p:grpSpPr bwMode="auto">
+        <a:xfrm>
+          <a:off x="0" y="0"/>
+          <a:ext cx="0" cy="0"/>
+          <a:chOff x="0" y="0"/>
+          <a:chExt cx="0" cy="0"/>
+        </a:xfrm>
+      </p:grpSpPr>
+      <p:sp>
+        <p:nvSpPr>
+          <p:cNvPr id="1532590741" name=""/>
+          <p:cNvSpPr txBox="1"/>
+          <p:nvPr/>
+        </p:nvSpPr>
+        <p:spPr bwMode="auto">
+          <a:xfrm flipH="0" flipV="0">
+            <a:off x="968778" y="743411"/>
+            <a:ext cx="10731731" cy="2286360"/>
+          </a:xfrm>
+          <a:prstGeom prst="rect">
+            <a:avLst/>
+          </a:prstGeom>
+          <a:noFill/>
+        </p:spPr>
+        <p:txBody>
+          <a:bodyPr vertOverflow="overflow" horzOverflow="overflow" vert="horz" wrap="square" lIns="91440" tIns="45720" rIns="91440" bIns="45720" numCol="1" spcCol="0" rtlCol="0" fromWordArt="0" anchor="t" anchorCtr="0" forceAA="0" upright="0" compatLnSpc="0">
+            <a:spAutoFit/>
+          </a:bodyPr>
+          <a:p>
+            <a:pPr>
+              <a:defRPr/>
+            </a:pPr>
+            <a:r>
+              <a:rPr lang="fr-FR" sz="7200" b="0" i="0" u="none" strike="noStrike" cap="none" spc="0">
+                <a:solidFill>
+                  <a:schemeClr val="tx1"/>
+                </a:solidFill>
+                <a:latin typeface="Century Gothic"/>
+                <a:ea typeface="Century Gothic"/>
+                <a:cs typeface="Century Gothic"/>
+              </a:rPr>
+              <a:t>Easy colors customization</a:t>
+            </a:r>
+            <a:endParaRPr sz="7200">
+              <a:latin typeface="Century Gothic"/>
+              <a:cs typeface="Century Gothic"/>
+            </a:endParaRPr>
+          </a:p>
+        </p:txBody>
+      </p:sp>
+      <p:sp>
+        <p:nvSpPr>
+          <p:cNvPr id="1706395948" name=""/>
+          <p:cNvSpPr txBox="1"/>
+          <p:nvPr/>
+        </p:nvSpPr>
+        <p:spPr bwMode="auto">
+          <a:xfrm flipH="0" flipV="0">
+            <a:off x="1082911" y="4031939"/>
+            <a:ext cx="8793312" cy="366119"/>
+          </a:xfrm>
+          <a:prstGeom prst="rect">
+            <a:avLst/>
+          </a:prstGeom>
+          <a:noFill/>
+        </p:spPr>
+        <p:txBody>
+          <a:bodyPr vertOverflow="overflow" horzOverflow="overflow" vert="horz" wrap="square" lIns="91440" tIns="45720" rIns="91440" bIns="45720" numCol="1" spcCol="0" rtlCol="0" fromWordArt="0" anchor="t" anchorCtr="0" forceAA="0" upright="0" compatLnSpc="0">
+            <a:spAutoFit/>
+          </a:bodyPr>
+          <a:p>
+            <a:pPr>
+              <a:defRPr/>
+            </a:pPr>
+            <a:r>
+              <a:rPr/>
+              <a:t>Theme CSS</a:t>
+            </a:r>
+            <a:endParaRPr/>
+          </a:p>
+        </p:txBody>
+      </p:sp>
+    </p:spTree>
+  </p:cSld>
+  <p:clrMapOvr>
+    <a:masterClrMapping/>
+  </p:clrMapOvr>
+  <mc:AlternateContent xmlns:mc="http://schemas.openxmlformats.org/markup-compatibility/2006">
+    <mc:Choice xmlns:p159="http://schemas.microsoft.com/office/powerpoint/2015/09/main" xmlns:p14="http://schemas.microsoft.com/office/powerpoint/2010/main" Requires="p159">
+      <p:transition p14:dur="2000" advClick="1"/>
+    </mc:Choice>
+    <mc:Fallback>
+      <p:transition advClick="1"/>
+    </mc:Fallback>
+  </mc:AlternateContent>
+</p:sld>
+</file>
+
+<file path=ppt/slides/slide32.xml><?xml version="1.0" encoding="utf-8"?>
 <p:sld xmlns:a="http://schemas.openxmlformats.org/drawingml/2006/main" xmlns:r="http://schemas.openxmlformats.org/officeDocument/2006/relationships" xmlns:p="http://schemas.openxmlformats.org/presentationml/2006/main" xmlns:m="http://schemas.openxmlformats.org/officeDocument/2006/math" xmlns:w="http://schemas.openxmlformats.org/wordprocessingml/2006/main" xmlns:mc="http://schemas.openxmlformats.org/markup-compatibility/2006" showMasterPhAnim="0" showMasterSp="1" show="1">
   <p:cSld name="">
     <p:spTree>
@@ -9776,7 +10116,7 @@
 </p:sld>
 </file>
 
-<file path=ppt/slides/slide31.xml><?xml version="1.0" encoding="utf-8"?>
+<file path=ppt/slides/slide33.xml><?xml version="1.0" encoding="utf-8"?>
 <p:sld xmlns:a="http://schemas.openxmlformats.org/drawingml/2006/main" xmlns:r="http://schemas.openxmlformats.org/officeDocument/2006/relationships" xmlns:p="http://schemas.openxmlformats.org/presentationml/2006/main" xmlns:m="http://schemas.openxmlformats.org/officeDocument/2006/math" xmlns:w="http://schemas.openxmlformats.org/wordprocessingml/2006/main" xmlns:mc="http://schemas.openxmlformats.org/markup-compatibility/2006" showMasterPhAnim="0" showMasterSp="1" show="1">
   <p:cSld name="">
     <p:spTree>
@@ -9917,7 +10257,7 @@
 </p:sld>
 </file>
 
-<file path=ppt/slides/slide32.xml><?xml version="1.0" encoding="utf-8"?>
+<file path=ppt/slides/slide34.xml><?xml version="1.0" encoding="utf-8"?>
 <p:sld xmlns:a="http://schemas.openxmlformats.org/drawingml/2006/main" xmlns:r="http://schemas.openxmlformats.org/officeDocument/2006/relationships" xmlns:p="http://schemas.openxmlformats.org/presentationml/2006/main" xmlns:m="http://schemas.openxmlformats.org/officeDocument/2006/math" xmlns:w="http://schemas.openxmlformats.org/wordprocessingml/2006/main" xmlns:mc="http://schemas.openxmlformats.org/markup-compatibility/2006" showMasterPhAnim="0" showMasterSp="1" show="1">
   <p:cSld name="">
     <p:spTree>
@@ -10110,7 +10450,7 @@
 </p:sld>
 </file>
 
-<file path=ppt/slides/slide33.xml><?xml version="1.0" encoding="utf-8"?>
+<file path=ppt/slides/slide35.xml><?xml version="1.0" encoding="utf-8"?>
 <p:sld xmlns:a="http://schemas.openxmlformats.org/drawingml/2006/main" xmlns:r="http://schemas.openxmlformats.org/officeDocument/2006/relationships" xmlns:p="http://schemas.openxmlformats.org/presentationml/2006/main" xmlns:m="http://schemas.openxmlformats.org/officeDocument/2006/math" xmlns:w="http://schemas.openxmlformats.org/wordprocessingml/2006/main" xmlns:mc="http://schemas.openxmlformats.org/markup-compatibility/2006" showMasterPhAnim="0" showMasterSp="1" show="1">
   <p:cSld name="">
     <p:spTree>
@@ -10217,7 +10557,7 @@
 </p:sld>
 </file>
 
-<file path=ppt/slides/slide34.xml><?xml version="1.0" encoding="utf-8"?>
+<file path=ppt/slides/slide36.xml><?xml version="1.0" encoding="utf-8"?>
 <p:sld xmlns:a="http://schemas.openxmlformats.org/drawingml/2006/main" xmlns:r="http://schemas.openxmlformats.org/officeDocument/2006/relationships" xmlns:p="http://schemas.openxmlformats.org/presentationml/2006/main" xmlns:m="http://schemas.openxmlformats.org/officeDocument/2006/math" xmlns:w="http://schemas.openxmlformats.org/wordprocessingml/2006/main" xmlns:mc="http://schemas.openxmlformats.org/markup-compatibility/2006" showMasterPhAnim="0" showMasterSp="1" show="1">
   <p:cSld name="">
     <p:spTree>
@@ -10264,7 +10604,7 @@
         </p:nvSpPr>
         <p:spPr bwMode="auto">
           <a:xfrm flipH="0" flipV="0">
-            <a:off x="5614223" y="4577548"/>
+            <a:off x="5614222" y="4577548"/>
             <a:ext cx="2580072" cy="2006723"/>
           </a:xfrm>
           <a:prstGeom prst="rect">
@@ -10295,366 +10635,6 @@
             <a:schemeClr val="lt1"/>
           </a:fontRef>
         </p:style>
-      </p:sp>
-    </p:spTree>
-  </p:cSld>
-  <p:clrMapOvr>
-    <a:masterClrMapping/>
-  </p:clrMapOvr>
-  <mc:AlternateContent xmlns:mc="http://schemas.openxmlformats.org/markup-compatibility/2006">
-    <mc:Choice xmlns:p159="http://schemas.microsoft.com/office/powerpoint/2015/09/main" xmlns:p14="http://schemas.microsoft.com/office/powerpoint/2010/main" Requires="p159">
-      <p:transition p14:dur="2000" advClick="1"/>
-    </mc:Choice>
-    <mc:Fallback>
-      <p:transition advClick="1"/>
-    </mc:Fallback>
-  </mc:AlternateContent>
-</p:sld>
-</file>
-
-<file path=ppt/slides/slide35.xml><?xml version="1.0" encoding="utf-8"?>
-<p:sld xmlns:a="http://schemas.openxmlformats.org/drawingml/2006/main" xmlns:r="http://schemas.openxmlformats.org/officeDocument/2006/relationships" xmlns:p="http://schemas.openxmlformats.org/presentationml/2006/main" xmlns:m="http://schemas.openxmlformats.org/officeDocument/2006/math" xmlns:w="http://schemas.openxmlformats.org/wordprocessingml/2006/main" xmlns:mc="http://schemas.openxmlformats.org/markup-compatibility/2006" showMasterPhAnim="0" showMasterSp="1" show="1">
-  <p:cSld name="">
-    <p:spTree>
-      <p:nvGrpSpPr>
-        <p:cNvPr id="1" name=""/>
-        <p:cNvGrpSpPr/>
-        <p:nvPr/>
-      </p:nvGrpSpPr>
-      <p:grpSpPr bwMode="auto">
-        <a:xfrm>
-          <a:off x="0" y="0"/>
-          <a:ext cx="0" cy="0"/>
-          <a:chOff x="0" y="0"/>
-          <a:chExt cx="0" cy="0"/>
-        </a:xfrm>
-      </p:grpSpPr>
-      <p:sp>
-        <p:nvSpPr>
-          <p:cNvPr id="2137009397" name=""/>
-          <p:cNvSpPr txBox="1"/>
-          <p:nvPr/>
-        </p:nvSpPr>
-        <p:spPr bwMode="auto">
-          <a:xfrm flipH="0" flipV="0">
-            <a:off x="968778" y="743411"/>
-            <a:ext cx="10773131" cy="2286360"/>
-          </a:xfrm>
-          <a:prstGeom prst="rect">
-            <a:avLst/>
-          </a:prstGeom>
-          <a:noFill/>
-        </p:spPr>
-        <p:txBody>
-          <a:bodyPr vertOverflow="overflow" horzOverflow="overflow" vert="horz" wrap="square" lIns="91440" tIns="45720" rIns="91440" bIns="45720" numCol="1" spcCol="0" rtlCol="0" fromWordArt="0" anchor="t" anchorCtr="0" forceAA="0" upright="0" compatLnSpc="0">
-            <a:spAutoFit/>
-          </a:bodyPr>
-          <a:p>
-            <a:pPr>
-              <a:defRPr/>
-            </a:pPr>
-            <a:r>
-              <a:rPr lang="fr-FR" sz="7200" b="0" i="0" u="none" strike="noStrike" cap="none" spc="0">
-                <a:solidFill>
-                  <a:schemeClr val="tx1"/>
-                </a:solidFill>
-                <a:latin typeface="Century Gothic"/>
-                <a:ea typeface="Century Gothic"/>
-                <a:cs typeface="Century Gothic"/>
-              </a:rPr>
-              <a:t>Different configuration strategies</a:t>
-            </a:r>
-            <a:endParaRPr sz="7200">
-              <a:latin typeface="Century Gothic"/>
-              <a:cs typeface="Century Gothic"/>
-            </a:endParaRPr>
-          </a:p>
-        </p:txBody>
-      </p:sp>
-      <p:sp>
-        <p:nvSpPr>
-          <p:cNvPr id="1577567452" name=""/>
-          <p:cNvSpPr txBox="1"/>
-          <p:nvPr/>
-        </p:nvSpPr>
-        <p:spPr bwMode="auto">
-          <a:xfrm flipH="0" flipV="0">
-            <a:off x="1082911" y="3893226"/>
-            <a:ext cx="8817072" cy="2012039"/>
-          </a:xfrm>
-          <a:prstGeom prst="rect">
-            <a:avLst/>
-          </a:prstGeom>
-          <a:noFill/>
-        </p:spPr>
-        <p:txBody>
-          <a:bodyPr vertOverflow="overflow" horzOverflow="overflow" vert="horz" wrap="square" lIns="91440" tIns="45720" rIns="91440" bIns="45720" numCol="1" spcCol="0" rtlCol="0" fromWordArt="0" anchor="t" anchorCtr="0" forceAA="0" upright="0" compatLnSpc="0">
-            <a:spAutoFit/>
-          </a:bodyPr>
-          <a:p>
-            <a:pPr marL="283879" indent="-283879">
-              <a:buFont typeface="Arial"/>
-              <a:buAutoNum type="arabicPeriod"/>
-              <a:defRPr/>
-            </a:pPr>
-            <a:r>
-              <a:rPr lang="fr-FR" sz="1800" b="0" i="0" u="none" strike="noStrike" cap="none" spc="0">
-                <a:solidFill>
-                  <a:schemeClr val="tx1"/>
-                </a:solidFill>
-                <a:latin typeface="Arial"/>
-                <a:ea typeface="Arial"/>
-                <a:cs typeface="Arial"/>
-              </a:rPr>
-              <a:t>Use the same SHACL spec as the knowledge graph specification</a:t>
-            </a:r>
-            <a:endParaRPr lang="fr-FR" sz="1800" b="0" i="0" u="none" strike="noStrike" cap="none" spc="0">
-              <a:solidFill>
-                <a:schemeClr val="tx1"/>
-              </a:solidFill>
-              <a:latin typeface="Arial"/>
-              <a:ea typeface="Arial"/>
-              <a:cs typeface="Arial"/>
-            </a:endParaRPr>
-          </a:p>
-          <a:p>
-            <a:pPr marL="283879" indent="-283879">
-              <a:buFont typeface="Arial"/>
-              <a:buAutoNum type="arabicPeriod"/>
-              <a:defRPr/>
-            </a:pPr>
-            <a:r>
-              <a:rPr lang="fr-FR" sz="1800" b="0" i="0" u="none" strike="noStrike" cap="none" spc="0">
-                <a:solidFill>
-                  <a:schemeClr val="tx1"/>
-                </a:solidFill>
-                <a:latin typeface="Arial"/>
-                <a:ea typeface="Arial"/>
-                <a:cs typeface="Arial"/>
-              </a:rPr>
-              <a:t>Or write a custom tailored SHACL spec for the UI</a:t>
-            </a:r>
-            <a:endParaRPr lang="fr-FR" sz="1800" b="0" i="0" u="none" strike="noStrike" cap="none" spc="0">
-              <a:solidFill>
-                <a:schemeClr val="tx1"/>
-              </a:solidFill>
-              <a:latin typeface="Arial"/>
-              <a:ea typeface="Arial"/>
-              <a:cs typeface="Arial"/>
-            </a:endParaRPr>
-          </a:p>
-          <a:p>
-            <a:pPr marL="683929" lvl="1" indent="-283879">
-              <a:buFont typeface="Arial"/>
-              <a:buChar char="–"/>
-              <a:defRPr/>
-            </a:pPr>
-            <a:r>
-              <a:rPr lang="fr-FR" sz="1800" b="0" i="0" u="none" strike="noStrike" cap="none" spc="0">
-                <a:solidFill>
-                  <a:schemeClr val="tx1"/>
-                </a:solidFill>
-                <a:latin typeface="Arial"/>
-                <a:ea typeface="Arial"/>
-                <a:cs typeface="Arial"/>
-              </a:rPr>
-              <a:t>hide entities or properties</a:t>
-            </a:r>
-            <a:endParaRPr lang="fr-FR" sz="1800" b="0" i="0" u="none" strike="noStrike" cap="none" spc="0">
-              <a:solidFill>
-                <a:schemeClr val="tx1"/>
-              </a:solidFill>
-              <a:latin typeface="Arial"/>
-              <a:ea typeface="Arial"/>
-              <a:cs typeface="Arial"/>
-            </a:endParaRPr>
-          </a:p>
-          <a:p>
-            <a:pPr marL="683929" lvl="1" indent="-283879">
-              <a:buFont typeface="Arial"/>
-              <a:buChar char="–"/>
-              <a:defRPr/>
-            </a:pPr>
-            <a:r>
-              <a:rPr lang="fr-FR" sz="1800" b="0" i="0" u="none" strike="noStrike" cap="none" spc="0">
-                <a:solidFill>
-                  <a:schemeClr val="tx1"/>
-                </a:solidFill>
-                <a:latin typeface="Arial"/>
-                <a:ea typeface="Arial"/>
-                <a:cs typeface="Arial"/>
-              </a:rPr>
-              <a:t>take shortcuts</a:t>
-            </a:r>
-            <a:endParaRPr lang="fr-FR" sz="1800" b="0" i="0" u="none" strike="noStrike" cap="none" spc="0">
-              <a:solidFill>
-                <a:schemeClr val="tx1"/>
-              </a:solidFill>
-              <a:latin typeface="Arial"/>
-              <a:ea typeface="Arial"/>
-              <a:cs typeface="Arial"/>
-            </a:endParaRPr>
-          </a:p>
-          <a:p>
-            <a:pPr marL="683929" lvl="1" indent="-283879">
-              <a:buFont typeface="Arial"/>
-              <a:buChar char="–"/>
-              <a:defRPr/>
-            </a:pPr>
-            <a:r>
-              <a:rPr lang="fr-FR" sz="1800" b="0" i="0" u="none" strike="noStrike" cap="none" spc="0">
-                <a:solidFill>
-                  <a:schemeClr val="tx1"/>
-                </a:solidFill>
-                <a:latin typeface="Arial"/>
-                <a:ea typeface="Arial"/>
-                <a:cs typeface="Arial"/>
-              </a:rPr>
-              <a:t>etc...</a:t>
-            </a:r>
-            <a:endParaRPr lang="fr-FR" sz="1800" b="0" i="0" u="none" strike="noStrike" cap="none" spc="0">
-              <a:solidFill>
-                <a:schemeClr val="tx1"/>
-              </a:solidFill>
-              <a:latin typeface="Arial"/>
-              <a:ea typeface="Arial"/>
-              <a:cs typeface="Arial"/>
-            </a:endParaRPr>
-          </a:p>
-          <a:p>
-            <a:pPr marL="283879" lvl="0" indent="-283879">
-              <a:buFont typeface="Arial"/>
-              <a:buAutoNum type="arabicPeriod"/>
-              <a:defRPr/>
-            </a:pPr>
-            <a:r>
-              <a:rPr lang="fr-FR" sz="1800" b="0" i="0" u="none" strike="noStrike" cap="none" spc="0">
-                <a:solidFill>
-                  <a:schemeClr val="tx1"/>
-                </a:solidFill>
-                <a:latin typeface="Arial"/>
-                <a:ea typeface="Arial"/>
-                <a:cs typeface="Arial"/>
-              </a:rPr>
-              <a:t>Or use the same SHACL spec as KG specification, + additionnal customisation layer</a:t>
-            </a:r>
-            <a:endParaRPr lang="fr-FR" sz="1800" b="0" i="0" u="none" strike="noStrike" cap="none" spc="0">
-              <a:solidFill>
-                <a:schemeClr val="tx1"/>
-              </a:solidFill>
-              <a:latin typeface="Arial"/>
-              <a:ea typeface="Arial"/>
-              <a:cs typeface="Arial"/>
-            </a:endParaRPr>
-          </a:p>
-        </p:txBody>
-      </p:sp>
-    </p:spTree>
-  </p:cSld>
-  <p:clrMapOvr>
-    <a:masterClrMapping/>
-  </p:clrMapOvr>
-  <mc:AlternateContent xmlns:mc="http://schemas.openxmlformats.org/markup-compatibility/2006">
-    <mc:Choice xmlns:p159="http://schemas.microsoft.com/office/powerpoint/2015/09/main" xmlns:p14="http://schemas.microsoft.com/office/powerpoint/2010/main" Requires="p159">
-      <p:transition p14:dur="2000" advClick="1"/>
-    </mc:Choice>
-    <mc:Fallback>
-      <p:transition advClick="1"/>
-    </mc:Fallback>
-  </mc:AlternateContent>
-</p:sld>
-</file>
-
-<file path=ppt/slides/slide36.xml><?xml version="1.0" encoding="utf-8"?>
-<p:sld xmlns:a="http://schemas.openxmlformats.org/drawingml/2006/main" xmlns:r="http://schemas.openxmlformats.org/officeDocument/2006/relationships" xmlns:p="http://schemas.openxmlformats.org/presentationml/2006/main" xmlns:m="http://schemas.openxmlformats.org/officeDocument/2006/math" xmlns:w="http://schemas.openxmlformats.org/wordprocessingml/2006/main" xmlns:mc="http://schemas.openxmlformats.org/markup-compatibility/2006" showMasterPhAnim="0" showMasterSp="1" show="1">
-  <p:cSld name="">
-    <p:spTree>
-      <p:nvGrpSpPr>
-        <p:cNvPr id="1" name=""/>
-        <p:cNvGrpSpPr/>
-        <p:nvPr/>
-      </p:nvGrpSpPr>
-      <p:grpSpPr bwMode="auto">
-        <a:xfrm>
-          <a:off x="0" y="0"/>
-          <a:ext cx="0" cy="0"/>
-          <a:chOff x="0" y="0"/>
-          <a:chExt cx="0" cy="0"/>
-        </a:xfrm>
-      </p:grpSpPr>
-      <p:sp>
-        <p:nvSpPr>
-          <p:cNvPr id="1494706825" name=""/>
-          <p:cNvSpPr txBox="1"/>
-          <p:nvPr/>
-        </p:nvSpPr>
-        <p:spPr bwMode="auto">
-          <a:xfrm flipH="0" flipV="0">
-            <a:off x="968778" y="743411"/>
-            <a:ext cx="10797971" cy="3383639"/>
-          </a:xfrm>
-          <a:prstGeom prst="rect">
-            <a:avLst/>
-          </a:prstGeom>
-          <a:noFill/>
-        </p:spPr>
-        <p:txBody>
-          <a:bodyPr vertOverflow="overflow" horzOverflow="overflow" vert="horz" wrap="square" lIns="91440" tIns="45720" rIns="91440" bIns="45720" numCol="1" spcCol="0" rtlCol="0" fromWordArt="0" anchor="t" anchorCtr="0" forceAA="0" upright="0" compatLnSpc="0">
-            <a:spAutoFit/>
-          </a:bodyPr>
-          <a:p>
-            <a:pPr>
-              <a:defRPr/>
-            </a:pPr>
-            <a:r>
-              <a:rPr lang="fr-FR" sz="7200" b="0" i="0" u="none" strike="noStrike" cap="none" spc="0">
-                <a:solidFill>
-                  <a:schemeClr val="tx1"/>
-                </a:solidFill>
-                <a:latin typeface="Century Gothic"/>
-                <a:ea typeface="Century Gothic"/>
-                <a:cs typeface="Century Gothic"/>
-              </a:rPr>
-              <a:t>You can provide different configurations over the same KG</a:t>
-            </a:r>
-            <a:endParaRPr sz="7200">
-              <a:latin typeface="Century Gothic"/>
-              <a:cs typeface="Century Gothic"/>
-            </a:endParaRPr>
-          </a:p>
-        </p:txBody>
-      </p:sp>
-      <p:sp>
-        <p:nvSpPr>
-          <p:cNvPr id="891012694" name=""/>
-          <p:cNvSpPr txBox="1"/>
-          <p:nvPr/>
-        </p:nvSpPr>
-        <p:spPr bwMode="auto">
-          <a:xfrm flipH="0" flipV="0">
-            <a:off x="1082911" y="5187885"/>
-            <a:ext cx="8830392" cy="366119"/>
-          </a:xfrm>
-          <a:prstGeom prst="rect">
-            <a:avLst/>
-          </a:prstGeom>
-          <a:noFill/>
-        </p:spPr>
-        <p:txBody>
-          <a:bodyPr vertOverflow="overflow" horzOverflow="overflow" vert="horz" wrap="square" lIns="91440" tIns="45720" rIns="91440" bIns="45720" numCol="1" spcCol="0" rtlCol="0" fromWordArt="0" anchor="t" anchorCtr="0" forceAA="0" upright="0" compatLnSpc="0">
-            <a:spAutoFit/>
-          </a:bodyPr>
-          <a:p>
-            <a:pPr>
-              <a:defRPr/>
-            </a:pPr>
-            <a:r>
-              <a:rPr/>
-              <a:t>« Beginners » vs. « advanced » users</a:t>
-            </a:r>
-            <a:endParaRPr/>
-          </a:p>
-        </p:txBody>
       </p:sp>
     </p:spTree>
   </p:cSld>
@@ -10691,14 +10671,14 @@
       </p:grpSpPr>
       <p:sp>
         <p:nvSpPr>
-          <p:cNvPr id="773261898" name=""/>
+          <p:cNvPr id="2137009397" name=""/>
           <p:cNvSpPr txBox="1"/>
           <p:nvPr/>
         </p:nvSpPr>
         <p:spPr bwMode="auto">
           <a:xfrm flipH="0" flipV="0">
             <a:off x="968778" y="743411"/>
-            <a:ext cx="10820291" cy="4480919"/>
+            <a:ext cx="10773131" cy="2286360"/>
           </a:xfrm>
           <a:prstGeom prst="rect">
             <a:avLst/>
@@ -10722,7 +10702,7 @@
                 <a:ea typeface="Century Gothic"/>
                 <a:cs typeface="Century Gothic"/>
               </a:rPr>
-              <a:t>It is possible to generate a SHACL specification automatically</a:t>
+              <a:t>Different configuration strategies</a:t>
             </a:r>
             <a:endParaRPr sz="7200">
               <a:latin typeface="Century Gothic"/>
@@ -10733,14 +10713,14 @@
       </p:sp>
       <p:sp>
         <p:nvSpPr>
-          <p:cNvPr id="231973669" name=""/>
+          <p:cNvPr id="1577567452" name=""/>
           <p:cNvSpPr txBox="1"/>
           <p:nvPr/>
         </p:nvSpPr>
         <p:spPr bwMode="auto">
           <a:xfrm flipH="0" flipV="0">
-            <a:off x="1082911" y="5511551"/>
-            <a:ext cx="8831112" cy="366119"/>
+            <a:off x="1082911" y="3893226"/>
+            <a:ext cx="8817072" cy="2012039"/>
           </a:xfrm>
           <a:prstGeom prst="rect">
             <a:avLst/>
@@ -10752,26 +10732,160 @@
             <a:spAutoFit/>
           </a:bodyPr>
           <a:p>
-            <a:pPr>
-              <a:defRPr/>
-            </a:pPr>
-            <a:r>
-              <a:rPr lang="fr-FR" sz="1800" b="0" i="0" u="sng" strike="noStrike" cap="none" spc="0">
+            <a:pPr marL="283879" indent="-283879">
+              <a:buFont typeface="Arial"/>
+              <a:buAutoNum type="arabicPeriod"/>
+              <a:defRPr/>
+            </a:pPr>
+            <a:r>
+              <a:rPr lang="fr-FR" sz="1800" b="0" i="0" u="none" strike="noStrike" cap="none" spc="0">
                 <a:solidFill>
                   <a:schemeClr val="tx1"/>
                 </a:solidFill>
                 <a:latin typeface="Arial"/>
                 <a:ea typeface="Arial"/>
                 <a:cs typeface="Arial"/>
-                <a:hlinkClick r:id="rId3" tooltip="https://shacl-play.sparna.fr/play/generate"/>
               </a:rPr>
-              <a:t>https://shacl-play.sparna.fr/play/generate</a:t>
-            </a:r>
-            <a:r>
-              <a:rPr/>
-              <a:t> </a:t>
-            </a:r>
-            <a:endParaRPr/>
+              <a:t>Use the same SHACL spec as the knowledge graph specification</a:t>
+            </a:r>
+            <a:endParaRPr lang="fr-FR" sz="1800" b="0" i="0" u="none" strike="noStrike" cap="none" spc="0">
+              <a:solidFill>
+                <a:schemeClr val="tx1"/>
+              </a:solidFill>
+              <a:latin typeface="Arial"/>
+              <a:ea typeface="Arial"/>
+              <a:cs typeface="Arial"/>
+            </a:endParaRPr>
+          </a:p>
+          <a:p>
+            <a:pPr marL="283879" indent="-283879">
+              <a:buFont typeface="Arial"/>
+              <a:buAutoNum type="arabicPeriod"/>
+              <a:defRPr/>
+            </a:pPr>
+            <a:r>
+              <a:rPr lang="fr-FR" sz="1800" b="0" i="0" u="none" strike="noStrike" cap="none" spc="0">
+                <a:solidFill>
+                  <a:schemeClr val="tx1"/>
+                </a:solidFill>
+                <a:latin typeface="Arial"/>
+                <a:ea typeface="Arial"/>
+                <a:cs typeface="Arial"/>
+              </a:rPr>
+              <a:t>Or write a custom tailored SHACL spec for the UI</a:t>
+            </a:r>
+            <a:endParaRPr lang="fr-FR" sz="1800" b="0" i="0" u="none" strike="noStrike" cap="none" spc="0">
+              <a:solidFill>
+                <a:schemeClr val="tx1"/>
+              </a:solidFill>
+              <a:latin typeface="Arial"/>
+              <a:ea typeface="Arial"/>
+              <a:cs typeface="Arial"/>
+            </a:endParaRPr>
+          </a:p>
+          <a:p>
+            <a:pPr marL="683929" lvl="1" indent="-283879">
+              <a:buFont typeface="Arial"/>
+              <a:buChar char="–"/>
+              <a:defRPr/>
+            </a:pPr>
+            <a:r>
+              <a:rPr lang="fr-FR" sz="1800" b="0" i="0" u="none" strike="noStrike" cap="none" spc="0">
+                <a:solidFill>
+                  <a:schemeClr val="tx1"/>
+                </a:solidFill>
+                <a:latin typeface="Arial"/>
+                <a:ea typeface="Arial"/>
+                <a:cs typeface="Arial"/>
+              </a:rPr>
+              <a:t>hide entities or properties</a:t>
+            </a:r>
+            <a:endParaRPr lang="fr-FR" sz="1800" b="0" i="0" u="none" strike="noStrike" cap="none" spc="0">
+              <a:solidFill>
+                <a:schemeClr val="tx1"/>
+              </a:solidFill>
+              <a:latin typeface="Arial"/>
+              <a:ea typeface="Arial"/>
+              <a:cs typeface="Arial"/>
+            </a:endParaRPr>
+          </a:p>
+          <a:p>
+            <a:pPr marL="683929" lvl="1" indent="-283879">
+              <a:buFont typeface="Arial"/>
+              <a:buChar char="–"/>
+              <a:defRPr/>
+            </a:pPr>
+            <a:r>
+              <a:rPr lang="fr-FR" sz="1800" b="0" i="0" u="none" strike="noStrike" cap="none" spc="0">
+                <a:solidFill>
+                  <a:schemeClr val="tx1"/>
+                </a:solidFill>
+                <a:latin typeface="Arial"/>
+                <a:ea typeface="Arial"/>
+                <a:cs typeface="Arial"/>
+              </a:rPr>
+              <a:t>take shortcuts</a:t>
+            </a:r>
+            <a:endParaRPr lang="fr-FR" sz="1800" b="0" i="0" u="none" strike="noStrike" cap="none" spc="0">
+              <a:solidFill>
+                <a:schemeClr val="tx1"/>
+              </a:solidFill>
+              <a:latin typeface="Arial"/>
+              <a:ea typeface="Arial"/>
+              <a:cs typeface="Arial"/>
+            </a:endParaRPr>
+          </a:p>
+          <a:p>
+            <a:pPr marL="683929" lvl="1" indent="-283879">
+              <a:buFont typeface="Arial"/>
+              <a:buChar char="–"/>
+              <a:defRPr/>
+            </a:pPr>
+            <a:r>
+              <a:rPr lang="fr-FR" sz="1800" b="0" i="0" u="none" strike="noStrike" cap="none" spc="0">
+                <a:solidFill>
+                  <a:schemeClr val="tx1"/>
+                </a:solidFill>
+                <a:latin typeface="Arial"/>
+                <a:ea typeface="Arial"/>
+                <a:cs typeface="Arial"/>
+              </a:rPr>
+              <a:t>etc...</a:t>
+            </a:r>
+            <a:endParaRPr lang="fr-FR" sz="1800" b="0" i="0" u="none" strike="noStrike" cap="none" spc="0">
+              <a:solidFill>
+                <a:schemeClr val="tx1"/>
+              </a:solidFill>
+              <a:latin typeface="Arial"/>
+              <a:ea typeface="Arial"/>
+              <a:cs typeface="Arial"/>
+            </a:endParaRPr>
+          </a:p>
+          <a:p>
+            <a:pPr marL="283879" lvl="0" indent="-283879">
+              <a:buFont typeface="Arial"/>
+              <a:buAutoNum type="arabicPeriod"/>
+              <a:defRPr/>
+            </a:pPr>
+            <a:r>
+              <a:rPr lang="fr-FR" sz="1800" b="0" i="0" u="none" strike="noStrike" cap="none" spc="0">
+                <a:solidFill>
+                  <a:schemeClr val="tx1"/>
+                </a:solidFill>
+                <a:latin typeface="Arial"/>
+                <a:ea typeface="Arial"/>
+                <a:cs typeface="Arial"/>
+              </a:rPr>
+              <a:t>Or use the same SHACL spec as KG specification, + additionnal customisation layer</a:t>
+            </a:r>
+            <a:endParaRPr lang="fr-FR" sz="1800" b="0" i="0" u="none" strike="noStrike" cap="none" spc="0">
+              <a:solidFill>
+                <a:schemeClr val="tx1"/>
+              </a:solidFill>
+              <a:latin typeface="Arial"/>
+              <a:ea typeface="Arial"/>
+              <a:cs typeface="Arial"/>
+            </a:endParaRPr>
           </a:p>
         </p:txBody>
       </p:sp>
@@ -10810,14 +10924,14 @@
       </p:grpSpPr>
       <p:sp>
         <p:nvSpPr>
-          <p:cNvPr id="2137502134" name=""/>
+          <p:cNvPr id="1494706825" name=""/>
           <p:cNvSpPr txBox="1"/>
           <p:nvPr/>
         </p:nvSpPr>
         <p:spPr bwMode="auto">
           <a:xfrm flipH="0" flipV="0">
             <a:off x="968778" y="743411"/>
-            <a:ext cx="10816331" cy="3383639"/>
+            <a:ext cx="10797971" cy="3383639"/>
           </a:xfrm>
           <a:prstGeom prst="rect">
             <a:avLst/>
@@ -10841,7 +10955,7 @@
                 <a:ea typeface="Century Gothic"/>
                 <a:cs typeface="Century Gothic"/>
               </a:rPr>
-              <a:t>The statistics of the datasets can be leveraged</a:t>
+              <a:t>You can provide different configurations over the same KG</a:t>
             </a:r>
             <a:endParaRPr sz="7200">
               <a:latin typeface="Century Gothic"/>
@@ -10852,14 +10966,14 @@
       </p:sp>
       <p:sp>
         <p:nvSpPr>
-          <p:cNvPr id="1579888387" name=""/>
+          <p:cNvPr id="891012694" name=""/>
           <p:cNvSpPr txBox="1"/>
           <p:nvPr/>
         </p:nvSpPr>
         <p:spPr bwMode="auto">
           <a:xfrm flipH="0" flipV="0">
             <a:off x="1082911" y="5187885"/>
-            <a:ext cx="8892672" cy="640440"/>
+            <a:ext cx="8830392" cy="366119"/>
           </a:xfrm>
           <a:prstGeom prst="rect">
             <a:avLst/>
@@ -10871,26 +10985,12 @@
             <a:spAutoFit/>
           </a:bodyPr>
           <a:p>
-            <a:pPr marL="283879" indent="-283879">
-              <a:buFont typeface="Arial"/>
-              <a:buChar char="–"/>
+            <a:pPr>
               <a:defRPr/>
             </a:pPr>
             <a:r>
               <a:rPr/>
-              <a:t>Show the amount of each entity in the first list</a:t>
-            </a:r>
-            <a:endParaRPr/>
-          </a:p>
-          <a:p>
-            <a:pPr marL="283879" indent="-283879">
-              <a:buFont typeface="Arial"/>
-              <a:buChar char="–"/>
-              <a:defRPr/>
-            </a:pPr>
-            <a:r>
-              <a:rPr/>
-              <a:t>Automatically set widget to dropdown list if there are a few distinct values</a:t>
+              <a:t>« Beginners » vs. « advanced » users</a:t>
             </a:r>
             <a:endParaRPr/>
           </a:p>
@@ -10929,28 +11029,92 @@
           <a:chExt cx="0" cy="0"/>
         </a:xfrm>
       </p:grpSpPr>
-      <p:pic>
-        <p:nvPicPr>
-          <p:cNvPr id="1960822673" name=""/>
-          <p:cNvPicPr>
-            <a:picLocks noChangeAspect="1"/>
-          </p:cNvPicPr>
+      <p:sp>
+        <p:nvSpPr>
+          <p:cNvPr id="773261898" name=""/>
+          <p:cNvSpPr txBox="1"/>
           <p:nvPr/>
-        </p:nvPicPr>
-        <p:blipFill>
-          <a:blip r:embed="rId3"/>
-          <a:stretch/>
-        </p:blipFill>
+        </p:nvSpPr>
         <p:spPr bwMode="auto">
           <a:xfrm flipH="0" flipV="0">
-            <a:off x="3088689" y="675072"/>
-            <a:ext cx="5142596" cy="5287119"/>
+            <a:off x="968778" y="743411"/>
+            <a:ext cx="10820291" cy="4480919"/>
           </a:xfrm>
           <a:prstGeom prst="rect">
             <a:avLst/>
           </a:prstGeom>
+          <a:noFill/>
         </p:spPr>
-      </p:pic>
+        <p:txBody>
+          <a:bodyPr vertOverflow="overflow" horzOverflow="overflow" vert="horz" wrap="square" lIns="91440" tIns="45720" rIns="91440" bIns="45720" numCol="1" spcCol="0" rtlCol="0" fromWordArt="0" anchor="t" anchorCtr="0" forceAA="0" upright="0" compatLnSpc="0">
+            <a:spAutoFit/>
+          </a:bodyPr>
+          <a:p>
+            <a:pPr>
+              <a:defRPr/>
+            </a:pPr>
+            <a:r>
+              <a:rPr lang="fr-FR" sz="7200" b="0" i="0" u="none" strike="noStrike" cap="none" spc="0">
+                <a:solidFill>
+                  <a:schemeClr val="tx1"/>
+                </a:solidFill>
+                <a:latin typeface="Century Gothic"/>
+                <a:ea typeface="Century Gothic"/>
+                <a:cs typeface="Century Gothic"/>
+              </a:rPr>
+              <a:t>It is possible to generate a SHACL specification automatically</a:t>
+            </a:r>
+            <a:endParaRPr sz="7200">
+              <a:latin typeface="Century Gothic"/>
+              <a:cs typeface="Century Gothic"/>
+            </a:endParaRPr>
+          </a:p>
+        </p:txBody>
+      </p:sp>
+      <p:sp>
+        <p:nvSpPr>
+          <p:cNvPr id="231973669" name=""/>
+          <p:cNvSpPr txBox="1"/>
+          <p:nvPr/>
+        </p:nvSpPr>
+        <p:spPr bwMode="auto">
+          <a:xfrm flipH="0" flipV="0">
+            <a:off x="1082911" y="5511551"/>
+            <a:ext cx="8831112" cy="366119"/>
+          </a:xfrm>
+          <a:prstGeom prst="rect">
+            <a:avLst/>
+          </a:prstGeom>
+          <a:noFill/>
+        </p:spPr>
+        <p:txBody>
+          <a:bodyPr vertOverflow="overflow" horzOverflow="overflow" vert="horz" wrap="square" lIns="91440" tIns="45720" rIns="91440" bIns="45720" numCol="1" spcCol="0" rtlCol="0" fromWordArt="0" anchor="t" anchorCtr="0" forceAA="0" upright="0" compatLnSpc="0">
+            <a:spAutoFit/>
+          </a:bodyPr>
+          <a:p>
+            <a:pPr>
+              <a:defRPr/>
+            </a:pPr>
+            <a:r>
+              <a:rPr lang="fr-FR" sz="1800" b="0" i="0" u="sng" strike="noStrike" cap="none" spc="0">
+                <a:solidFill>
+                  <a:schemeClr val="tx1"/>
+                </a:solidFill>
+                <a:latin typeface="Arial"/>
+                <a:ea typeface="Arial"/>
+                <a:cs typeface="Arial"/>
+                <a:hlinkClick r:id="rId3" tooltip="https://shacl-play.sparna.fr/play/generate"/>
+              </a:rPr>
+              <a:t>https://shacl-play.sparna.fr/play/generate</a:t>
+            </a:r>
+            <a:r>
+              <a:rPr/>
+              <a:t> </a:t>
+            </a:r>
+            <a:endParaRPr/>
+          </a:p>
+        </p:txBody>
+      </p:sp>
     </p:spTree>
   </p:cSld>
   <p:clrMapOvr>
@@ -11179,6 +11343,182 @@
       </p:grpSpPr>
       <p:sp>
         <p:nvSpPr>
+          <p:cNvPr id="2137502134" name=""/>
+          <p:cNvSpPr txBox="1"/>
+          <p:nvPr/>
+        </p:nvSpPr>
+        <p:spPr bwMode="auto">
+          <a:xfrm flipH="0" flipV="0">
+            <a:off x="968778" y="743411"/>
+            <a:ext cx="10816330" cy="3383639"/>
+          </a:xfrm>
+          <a:prstGeom prst="rect">
+            <a:avLst/>
+          </a:prstGeom>
+          <a:noFill/>
+        </p:spPr>
+        <p:txBody>
+          <a:bodyPr vertOverflow="overflow" horzOverflow="overflow" vert="horz" wrap="square" lIns="91440" tIns="45720" rIns="91440" bIns="45720" numCol="1" spcCol="0" rtlCol="0" fromWordArt="0" anchor="t" anchorCtr="0" forceAA="0" upright="0" compatLnSpc="0">
+            <a:spAutoFit/>
+          </a:bodyPr>
+          <a:p>
+            <a:pPr>
+              <a:defRPr/>
+            </a:pPr>
+            <a:r>
+              <a:rPr lang="fr-FR" sz="7200" b="0" i="0" u="none" strike="noStrike" cap="none" spc="0">
+                <a:solidFill>
+                  <a:schemeClr val="tx1"/>
+                </a:solidFill>
+                <a:latin typeface="Century Gothic"/>
+                <a:ea typeface="Century Gothic"/>
+                <a:cs typeface="Century Gothic"/>
+              </a:rPr>
+              <a:t>The statistics of the datasets can be leveraged</a:t>
+            </a:r>
+            <a:endParaRPr sz="7200">
+              <a:latin typeface="Century Gothic"/>
+              <a:cs typeface="Century Gothic"/>
+            </a:endParaRPr>
+          </a:p>
+        </p:txBody>
+      </p:sp>
+      <p:sp>
+        <p:nvSpPr>
+          <p:cNvPr id="1579888387" name=""/>
+          <p:cNvSpPr txBox="1"/>
+          <p:nvPr/>
+        </p:nvSpPr>
+        <p:spPr bwMode="auto">
+          <a:xfrm flipH="0" flipV="0">
+            <a:off x="1082911" y="5187885"/>
+            <a:ext cx="8892672" cy="640440"/>
+          </a:xfrm>
+          <a:prstGeom prst="rect">
+            <a:avLst/>
+          </a:prstGeom>
+          <a:noFill/>
+        </p:spPr>
+        <p:txBody>
+          <a:bodyPr vertOverflow="overflow" horzOverflow="overflow" vert="horz" wrap="square" lIns="91440" tIns="45720" rIns="91440" bIns="45720" numCol="1" spcCol="0" rtlCol="0" fromWordArt="0" anchor="t" anchorCtr="0" forceAA="0" upright="0" compatLnSpc="0">
+            <a:spAutoFit/>
+          </a:bodyPr>
+          <a:p>
+            <a:pPr marL="283879" indent="-283879">
+              <a:buFont typeface="Arial"/>
+              <a:buChar char="–"/>
+              <a:defRPr/>
+            </a:pPr>
+            <a:r>
+              <a:rPr/>
+              <a:t>Show the amount of each entity in the first list</a:t>
+            </a:r>
+            <a:endParaRPr/>
+          </a:p>
+          <a:p>
+            <a:pPr marL="283879" indent="-283879">
+              <a:buFont typeface="Arial"/>
+              <a:buChar char="–"/>
+              <a:defRPr/>
+            </a:pPr>
+            <a:r>
+              <a:rPr/>
+              <a:t>Automatically set widget to dropdown list if there are a few distinct values</a:t>
+            </a:r>
+            <a:endParaRPr/>
+          </a:p>
+        </p:txBody>
+      </p:sp>
+    </p:spTree>
+  </p:cSld>
+  <p:clrMapOvr>
+    <a:masterClrMapping/>
+  </p:clrMapOvr>
+  <mc:AlternateContent xmlns:mc="http://schemas.openxmlformats.org/markup-compatibility/2006">
+    <mc:Choice xmlns:p159="http://schemas.microsoft.com/office/powerpoint/2015/09/main" xmlns:p14="http://schemas.microsoft.com/office/powerpoint/2010/main" Requires="p159">
+      <p:transition p14:dur="2000" advClick="1"/>
+    </mc:Choice>
+    <mc:Fallback>
+      <p:transition advClick="1"/>
+    </mc:Fallback>
+  </mc:AlternateContent>
+</p:sld>
+</file>
+
+<file path=ppt/slides/slide41.xml><?xml version="1.0" encoding="utf-8"?>
+<p:sld xmlns:a="http://schemas.openxmlformats.org/drawingml/2006/main" xmlns:r="http://schemas.openxmlformats.org/officeDocument/2006/relationships" xmlns:p="http://schemas.openxmlformats.org/presentationml/2006/main" xmlns:m="http://schemas.openxmlformats.org/officeDocument/2006/math" xmlns:w="http://schemas.openxmlformats.org/wordprocessingml/2006/main" xmlns:mc="http://schemas.openxmlformats.org/markup-compatibility/2006" showMasterPhAnim="0" showMasterSp="1" show="1">
+  <p:cSld name="">
+    <p:spTree>
+      <p:nvGrpSpPr>
+        <p:cNvPr id="1" name=""/>
+        <p:cNvGrpSpPr/>
+        <p:nvPr/>
+      </p:nvGrpSpPr>
+      <p:grpSpPr bwMode="auto">
+        <a:xfrm>
+          <a:off x="0" y="0"/>
+          <a:ext cx="0" cy="0"/>
+          <a:chOff x="0" y="0"/>
+          <a:chExt cx="0" cy="0"/>
+        </a:xfrm>
+      </p:grpSpPr>
+      <p:pic>
+        <p:nvPicPr>
+          <p:cNvPr id="1960822673" name=""/>
+          <p:cNvPicPr>
+            <a:picLocks noChangeAspect="1"/>
+          </p:cNvPicPr>
+          <p:nvPr/>
+        </p:nvPicPr>
+        <p:blipFill>
+          <a:blip r:embed="rId3"/>
+          <a:stretch/>
+        </p:blipFill>
+        <p:spPr bwMode="auto">
+          <a:xfrm flipH="0" flipV="0">
+            <a:off x="3088689" y="675072"/>
+            <a:ext cx="5142596" cy="5287119"/>
+          </a:xfrm>
+          <a:prstGeom prst="rect">
+            <a:avLst/>
+          </a:prstGeom>
+        </p:spPr>
+      </p:pic>
+    </p:spTree>
+  </p:cSld>
+  <p:clrMapOvr>
+    <a:masterClrMapping/>
+  </p:clrMapOvr>
+  <mc:AlternateContent xmlns:mc="http://schemas.openxmlformats.org/markup-compatibility/2006">
+    <mc:Choice xmlns:p159="http://schemas.microsoft.com/office/powerpoint/2015/09/main" xmlns:p14="http://schemas.microsoft.com/office/powerpoint/2010/main" Requires="p159">
+      <p:transition p14:dur="2000" advClick="1"/>
+    </mc:Choice>
+    <mc:Fallback>
+      <p:transition advClick="1"/>
+    </mc:Fallback>
+  </mc:AlternateContent>
+</p:sld>
+</file>
+
+<file path=ppt/slides/slide42.xml><?xml version="1.0" encoding="utf-8"?>
+<p:sld xmlns:a="http://schemas.openxmlformats.org/drawingml/2006/main" xmlns:r="http://schemas.openxmlformats.org/officeDocument/2006/relationships" xmlns:p="http://schemas.openxmlformats.org/presentationml/2006/main" xmlns:m="http://schemas.openxmlformats.org/officeDocument/2006/math" xmlns:w="http://schemas.openxmlformats.org/wordprocessingml/2006/main" xmlns:mc="http://schemas.openxmlformats.org/markup-compatibility/2006" showMasterPhAnim="0" showMasterSp="1" show="1">
+  <p:cSld name="">
+    <p:spTree>
+      <p:nvGrpSpPr>
+        <p:cNvPr id="1" name=""/>
+        <p:cNvGrpSpPr/>
+        <p:nvPr/>
+      </p:nvGrpSpPr>
+      <p:grpSpPr bwMode="auto">
+        <a:xfrm>
+          <a:off x="0" y="0"/>
+          <a:ext cx="0" cy="0"/>
+          <a:chOff x="0" y="0"/>
+          <a:chExt cx="0" cy="0"/>
+        </a:xfrm>
+      </p:grpSpPr>
+      <p:sp>
+        <p:nvSpPr>
           <p:cNvPr id="1318709735" name="Titre 1"/>
           <p:cNvSpPr>
             <a:spLocks noGrp="1"/>
@@ -11353,353 +11693,6 @@
 </p:sld>
 </file>
 
-<file path=ppt/slides/slide41.xml><?xml version="1.0" encoding="utf-8"?>
-<p:sld xmlns:a="http://schemas.openxmlformats.org/drawingml/2006/main" xmlns:r="http://schemas.openxmlformats.org/officeDocument/2006/relationships" xmlns:p="http://schemas.openxmlformats.org/presentationml/2006/main" xmlns:m="http://schemas.openxmlformats.org/officeDocument/2006/math" xmlns:w="http://schemas.openxmlformats.org/wordprocessingml/2006/main" xmlns:mc="http://schemas.openxmlformats.org/markup-compatibility/2006" showMasterPhAnim="0" showMasterSp="1" show="1">
-  <p:cSld name="">
-    <p:spTree>
-      <p:nvGrpSpPr>
-        <p:cNvPr id="1" name=""/>
-        <p:cNvGrpSpPr/>
-        <p:nvPr/>
-      </p:nvGrpSpPr>
-      <p:grpSpPr bwMode="auto">
-        <a:xfrm>
-          <a:off x="0" y="0"/>
-          <a:ext cx="0" cy="0"/>
-          <a:chOff x="0" y="0"/>
-          <a:chExt cx="0" cy="0"/>
-        </a:xfrm>
-      </p:grpSpPr>
-      <p:sp>
-        <p:nvSpPr>
-          <p:cNvPr id="2034350329" name=""/>
-          <p:cNvSpPr txBox="1"/>
-          <p:nvPr/>
-        </p:nvSpPr>
-        <p:spPr bwMode="auto">
-          <a:xfrm flipH="0" flipV="0">
-            <a:off x="968778" y="743411"/>
-            <a:ext cx="10812371" cy="2286360"/>
-          </a:xfrm>
-          <a:prstGeom prst="rect">
-            <a:avLst/>
-          </a:prstGeom>
-          <a:noFill/>
-        </p:spPr>
-        <p:txBody>
-          <a:bodyPr vertOverflow="overflow" horzOverflow="overflow" vert="horz" wrap="square" lIns="91440" tIns="45720" rIns="91440" bIns="45720" numCol="1" spcCol="0" rtlCol="0" fromWordArt="0" anchor="t" anchorCtr="0" forceAA="0" upright="0" compatLnSpc="0">
-            <a:spAutoFit/>
-          </a:bodyPr>
-          <a:p>
-            <a:pPr>
-              <a:defRPr/>
-            </a:pPr>
-            <a:r>
-              <a:rPr lang="fr-FR" sz="7200" b="0" i="0" u="none" strike="noStrike" cap="none" spc="0">
-                <a:solidFill>
-                  <a:schemeClr val="tx1"/>
-                </a:solidFill>
-                <a:latin typeface="Century Gothic"/>
-                <a:ea typeface="Century Gothic"/>
-                <a:cs typeface="Century Gothic"/>
-              </a:rPr>
-              <a:t>Front-office query editor, for end-users</a:t>
-            </a:r>
-            <a:endParaRPr sz="7200">
-              <a:latin typeface="Century Gothic"/>
-              <a:cs typeface="Century Gothic"/>
-            </a:endParaRPr>
-          </a:p>
-        </p:txBody>
-      </p:sp>
-      <p:sp>
-        <p:nvSpPr>
-          <p:cNvPr id="1290968834" name=""/>
-          <p:cNvSpPr txBox="1"/>
-          <p:nvPr/>
-        </p:nvSpPr>
-        <p:spPr bwMode="auto">
-          <a:xfrm flipH="0" flipV="0">
-            <a:off x="1082911" y="4346356"/>
-            <a:ext cx="8847672" cy="914760"/>
-          </a:xfrm>
-          <a:prstGeom prst="rect">
-            <a:avLst/>
-          </a:prstGeom>
-          <a:noFill/>
-        </p:spPr>
-        <p:txBody>
-          <a:bodyPr vertOverflow="overflow" horzOverflow="overflow" vert="horz" wrap="square" lIns="91440" tIns="45720" rIns="91440" bIns="45720" numCol="1" spcCol="0" rtlCol="0" fromWordArt="0" anchor="t" anchorCtr="0" forceAA="0" upright="0" compatLnSpc="0">
-            <a:spAutoFit/>
-          </a:bodyPr>
-          <a:p>
-            <a:pPr marL="283879" indent="-283879">
-              <a:buFont typeface="Arial"/>
-              <a:buChar char="–"/>
-              <a:defRPr/>
-            </a:pPr>
-            <a:r>
-              <a:rPr lang="fr-FR" sz="1800" b="0" i="0" u="none" strike="noStrike" cap="none" spc="0">
-                <a:solidFill>
-                  <a:schemeClr val="tx1"/>
-                </a:solidFill>
-                <a:latin typeface="Arial"/>
-                <a:ea typeface="Arial"/>
-                <a:cs typeface="Arial"/>
-              </a:rPr>
-              <a:t>Use precise configs with end-user oriented labels and tooltips</a:t>
-            </a:r>
-            <a:endParaRPr lang="fr-FR" sz="1800" b="0" i="0" u="none" strike="noStrike" cap="none" spc="0">
-              <a:solidFill>
-                <a:schemeClr val="tx1"/>
-              </a:solidFill>
-              <a:latin typeface="Arial"/>
-              <a:ea typeface="Arial"/>
-              <a:cs typeface="Arial"/>
-            </a:endParaRPr>
-          </a:p>
-          <a:p>
-            <a:pPr marL="283879" indent="-283879">
-              <a:buFont typeface="Arial"/>
-              <a:buChar char="–"/>
-              <a:defRPr/>
-            </a:pPr>
-            <a:r>
-              <a:rPr lang="fr-FR" sz="1800" b="0" i="0" u="none" strike="noStrike" cap="none" spc="0">
-                <a:solidFill>
-                  <a:schemeClr val="tx1"/>
-                </a:solidFill>
-                <a:latin typeface="Arial"/>
-                <a:ea typeface="Arial"/>
-                <a:cs typeface="Arial"/>
-              </a:rPr>
-              <a:t>Provide sample queries</a:t>
-            </a:r>
-            <a:endParaRPr lang="fr-FR" sz="1800" b="0" i="0" u="none" strike="noStrike" cap="none" spc="0">
-              <a:solidFill>
-                <a:schemeClr val="tx1"/>
-              </a:solidFill>
-              <a:latin typeface="Arial"/>
-              <a:ea typeface="Arial"/>
-              <a:cs typeface="Arial"/>
-            </a:endParaRPr>
-          </a:p>
-          <a:p>
-            <a:pPr marL="283879" indent="-283879">
-              <a:buFont typeface="Arial"/>
-              <a:buChar char="–"/>
-              <a:defRPr/>
-            </a:pPr>
-            <a:r>
-              <a:rPr lang="fr-FR" sz="1800" b="0" i="0" u="none" strike="noStrike" cap="none" spc="0">
-                <a:solidFill>
-                  <a:schemeClr val="tx1"/>
-                </a:solidFill>
-                <a:latin typeface="Arial"/>
-                <a:ea typeface="Arial"/>
-                <a:cs typeface="Arial"/>
-              </a:rPr>
-              <a:t>Demonstrate the structure of the graph</a:t>
-            </a:r>
-            <a:endParaRPr lang="fr-FR" sz="1800" b="0" i="0" u="none" strike="noStrike" cap="none" spc="0">
-              <a:solidFill>
-                <a:schemeClr val="tx1"/>
-              </a:solidFill>
-              <a:latin typeface="Arial"/>
-              <a:cs typeface="Arial"/>
-            </a:endParaRPr>
-          </a:p>
-        </p:txBody>
-      </p:sp>
-    </p:spTree>
-  </p:cSld>
-  <p:clrMapOvr>
-    <a:masterClrMapping/>
-  </p:clrMapOvr>
-  <mc:AlternateContent xmlns:mc="http://schemas.openxmlformats.org/markup-compatibility/2006">
-    <mc:Choice xmlns:p159="http://schemas.microsoft.com/office/powerpoint/2015/09/main" xmlns:p14="http://schemas.microsoft.com/office/powerpoint/2010/main" Requires="p159">
-      <p:transition p14:dur="2000" advClick="1"/>
-    </mc:Choice>
-    <mc:Fallback>
-      <p:transition advClick="1"/>
-    </mc:Fallback>
-  </mc:AlternateContent>
-</p:sld>
-</file>
-
-<file path=ppt/slides/slide42.xml><?xml version="1.0" encoding="utf-8"?>
-<p:sld xmlns:a="http://schemas.openxmlformats.org/drawingml/2006/main" xmlns:r="http://schemas.openxmlformats.org/officeDocument/2006/relationships" xmlns:p="http://schemas.openxmlformats.org/presentationml/2006/main" xmlns:m="http://schemas.openxmlformats.org/officeDocument/2006/math" xmlns:w="http://schemas.openxmlformats.org/wordprocessingml/2006/main" xmlns:mc="http://schemas.openxmlformats.org/markup-compatibility/2006" showMasterPhAnim="0" showMasterSp="1" show="1">
-  <p:cSld name="">
-    <p:spTree>
-      <p:nvGrpSpPr>
-        <p:cNvPr id="1" name=""/>
-        <p:cNvGrpSpPr/>
-        <p:nvPr/>
-      </p:nvGrpSpPr>
-      <p:grpSpPr bwMode="auto">
-        <a:xfrm>
-          <a:off x="0" y="0"/>
-          <a:ext cx="0" cy="0"/>
-          <a:chOff x="0" y="0"/>
-          <a:chExt cx="0" cy="0"/>
-        </a:xfrm>
-      </p:grpSpPr>
-      <p:sp>
-        <p:nvSpPr>
-          <p:cNvPr id="909589562" name=""/>
-          <p:cNvSpPr txBox="1"/>
-          <p:nvPr/>
-        </p:nvSpPr>
-        <p:spPr bwMode="auto">
-          <a:xfrm flipH="0" flipV="0">
-            <a:off x="968778" y="743411"/>
-            <a:ext cx="10472136" cy="2286360"/>
-          </a:xfrm>
-          <a:prstGeom prst="rect">
-            <a:avLst/>
-          </a:prstGeom>
-          <a:noFill/>
-        </p:spPr>
-        <p:txBody>
-          <a:bodyPr vertOverflow="overflow" horzOverflow="overflow" vert="horz" wrap="square" lIns="91440" tIns="45720" rIns="91440" bIns="45720" numCol="1" spcCol="0" rtlCol="0" fromWordArt="0" anchor="t" anchorCtr="0" forceAA="0" upright="0" compatLnSpc="0">
-            <a:spAutoFit/>
-          </a:bodyPr>
-          <a:p>
-            <a:pPr>
-              <a:defRPr/>
-            </a:pPr>
-            <a:r>
-              <a:rPr lang="fr-FR" sz="7200" b="0" i="0" u="none" strike="noStrike" cap="none" spc="0">
-                <a:solidFill>
-                  <a:schemeClr val="tx1"/>
-                </a:solidFill>
-                <a:latin typeface="Century Gothic"/>
-                <a:ea typeface="Century Gothic"/>
-                <a:cs typeface="Century Gothic"/>
-              </a:rPr>
-              <a:t>Back-office analysis tool</a:t>
-            </a:r>
-            <a:endParaRPr sz="7200">
-              <a:latin typeface="Century Gothic"/>
-              <a:cs typeface="Century Gothic"/>
-            </a:endParaRPr>
-          </a:p>
-        </p:txBody>
-      </p:sp>
-      <p:sp>
-        <p:nvSpPr>
-          <p:cNvPr id="1702146303" name=""/>
-          <p:cNvSpPr txBox="1"/>
-          <p:nvPr/>
-        </p:nvSpPr>
-        <p:spPr bwMode="auto">
-          <a:xfrm flipH="0" flipV="0">
-            <a:off x="1082911" y="4346355"/>
-            <a:ext cx="8858472" cy="914760"/>
-          </a:xfrm>
-          <a:prstGeom prst="rect">
-            <a:avLst/>
-          </a:prstGeom>
-          <a:noFill/>
-        </p:spPr>
-        <p:txBody>
-          <a:bodyPr vertOverflow="overflow" horzOverflow="overflow" vert="horz" wrap="square" lIns="91440" tIns="45720" rIns="91440" bIns="45720" numCol="1" spcCol="0" rtlCol="0" fromWordArt="0" anchor="t" anchorCtr="0" forceAA="0" upright="0" compatLnSpc="0">
-            <a:spAutoFit/>
-          </a:bodyPr>
-          <a:p>
-            <a:pPr marL="283879" indent="-283879">
-              <a:buFont typeface="Arial"/>
-              <a:buChar char="–"/>
-              <a:defRPr/>
-            </a:pPr>
-            <a:r>
-              <a:rPr lang="fr-FR" sz="1800" b="0" i="0" u="none" strike="noStrike" cap="none" spc="0">
-                <a:solidFill>
-                  <a:schemeClr val="tx1"/>
-                </a:solidFill>
-                <a:latin typeface="Arial"/>
-                <a:ea typeface="Arial"/>
-                <a:cs typeface="Arial"/>
-              </a:rPr>
-              <a:t>Quality checks, quick reporting</a:t>
-            </a:r>
-            <a:endParaRPr lang="fr-FR" sz="1800" b="0" i="0" u="none" strike="noStrike" cap="none" spc="0">
-              <a:solidFill>
-                <a:schemeClr val="tx1"/>
-              </a:solidFill>
-              <a:latin typeface="Arial"/>
-              <a:ea typeface="Arial"/>
-              <a:cs typeface="Arial"/>
-            </a:endParaRPr>
-          </a:p>
-          <a:p>
-            <a:pPr marL="283879" indent="-283879">
-              <a:buFont typeface="Arial"/>
-              <a:buChar char="–"/>
-              <a:defRPr/>
-            </a:pPr>
-            <a:r>
-              <a:rPr lang="fr-FR" sz="1800" b="0" i="0" u="none" strike="noStrike" cap="none" spc="0">
-                <a:solidFill>
-                  <a:schemeClr val="tx1"/>
-                </a:solidFill>
-                <a:latin typeface="Arial"/>
-                <a:ea typeface="Arial"/>
-                <a:cs typeface="Arial"/>
-              </a:rPr>
-              <a:t>Detect inconsistencies</a:t>
-            </a:r>
-            <a:endParaRPr lang="fr-FR" sz="1800" b="0" i="0" u="none" strike="noStrike" cap="none" spc="0">
-              <a:solidFill>
-                <a:schemeClr val="tx1"/>
-              </a:solidFill>
-              <a:latin typeface="Arial"/>
-              <a:cs typeface="Arial"/>
-            </a:endParaRPr>
-          </a:p>
-          <a:p>
-            <a:pPr marL="283878" indent="-283878">
-              <a:buFont typeface="Arial"/>
-              <a:buChar char="–"/>
-              <a:defRPr/>
-            </a:pPr>
-            <a:r>
-              <a:rPr lang="fr-FR" sz="1800" b="0" i="0" u="none" strike="noStrike" cap="none" spc="0">
-                <a:solidFill>
-                  <a:schemeClr val="tx1"/>
-                </a:solidFill>
-                <a:latin typeface="Arial"/>
-                <a:ea typeface="Arial"/>
-                <a:cs typeface="Arial"/>
-              </a:rPr>
-              <a:t>Use a precise config matching the graph structure</a:t>
-            </a:r>
-            <a:endParaRPr lang="fr-FR" sz="1800" b="0" i="0" u="none" strike="noStrike" cap="none" spc="0">
-              <a:solidFill>
-                <a:schemeClr val="tx1"/>
-              </a:solidFill>
-              <a:latin typeface="Arial"/>
-              <a:cs typeface="Arial"/>
-            </a:endParaRPr>
-          </a:p>
-        </p:txBody>
-      </p:sp>
-    </p:spTree>
-  </p:cSld>
-  <p:clrMapOvr>
-    <a:masterClrMapping/>
-  </p:clrMapOvr>
-  <mc:AlternateContent xmlns:mc="http://schemas.openxmlformats.org/markup-compatibility/2006">
-    <mc:Choice xmlns:p159="http://schemas.microsoft.com/office/powerpoint/2015/09/main" xmlns:p14="http://schemas.microsoft.com/office/powerpoint/2010/main" Requires="p159">
-      <p:transition p14:dur="2000" advClick="1"/>
-    </mc:Choice>
-    <mc:Fallback>
-      <p:transition advClick="1"/>
-    </mc:Fallback>
-  </mc:AlternateContent>
-</p:sld>
-</file>
-
 <file path=ppt/slides/slide43.xml><?xml version="1.0" encoding="utf-8"?>
 <p:sld xmlns:a="http://schemas.openxmlformats.org/drawingml/2006/main" xmlns:r="http://schemas.openxmlformats.org/officeDocument/2006/relationships" xmlns:p="http://schemas.openxmlformats.org/presentationml/2006/main" xmlns:m="http://schemas.openxmlformats.org/officeDocument/2006/math" xmlns:w="http://schemas.openxmlformats.org/wordprocessingml/2006/main" xmlns:mc="http://schemas.openxmlformats.org/markup-compatibility/2006" showMasterPhAnim="0" showMasterSp="1" show="1">
   <p:cSld name="">
@@ -11719,14 +11712,14 @@
       </p:grpSpPr>
       <p:sp>
         <p:nvSpPr>
-          <p:cNvPr id="988142885" name=""/>
+          <p:cNvPr id="2034350329" name=""/>
           <p:cNvSpPr txBox="1"/>
           <p:nvPr/>
         </p:nvSpPr>
         <p:spPr bwMode="auto">
           <a:xfrm flipH="0" flipV="0">
             <a:off x="968778" y="743411"/>
-            <a:ext cx="10444393" cy="2286360"/>
+            <a:ext cx="10812371" cy="2286360"/>
           </a:xfrm>
           <a:prstGeom prst="rect">
             <a:avLst/>
@@ -11750,7 +11743,7 @@
                 <a:ea typeface="Century Gothic"/>
                 <a:cs typeface="Century Gothic"/>
               </a:rPr>
-              <a:t>Dataset production tool</a:t>
+              <a:t>Front-office query editor, for end-users</a:t>
             </a:r>
             <a:endParaRPr sz="7200">
               <a:latin typeface="Century Gothic"/>
@@ -11761,14 +11754,14 @@
       </p:sp>
       <p:sp>
         <p:nvSpPr>
-          <p:cNvPr id="646141916" name=""/>
+          <p:cNvPr id="1290968834" name=""/>
           <p:cNvSpPr txBox="1"/>
           <p:nvPr/>
         </p:nvSpPr>
         <p:spPr bwMode="auto">
           <a:xfrm flipH="0" flipV="0">
-            <a:off x="1082911" y="4346355"/>
-            <a:ext cx="8882232" cy="1189079"/>
+            <a:off x="1082911" y="4346356"/>
+            <a:ext cx="8847672" cy="914760"/>
           </a:xfrm>
           <a:prstGeom prst="rect">
             <a:avLst/>
@@ -11794,18 +11787,19 @@
                 <a:ea typeface="Arial"/>
                 <a:cs typeface="Arial"/>
               </a:rPr>
-              <a:t>Select a subset of entities from the graph</a:t>
+              <a:t>Use precise configs with end-user oriented labels and tooltips</a:t>
             </a:r>
             <a:endParaRPr lang="fr-FR" sz="1800" b="0" i="0" u="none" strike="noStrike" cap="none" spc="0">
               <a:solidFill>
                 <a:schemeClr val="tx1"/>
               </a:solidFill>
               <a:latin typeface="Arial"/>
+              <a:ea typeface="Arial"/>
               <a:cs typeface="Arial"/>
             </a:endParaRPr>
           </a:p>
           <a:p>
-            <a:pPr marL="283878" indent="-283878">
+            <a:pPr marL="283879" indent="-283879">
               <a:buFont typeface="Arial"/>
               <a:buChar char="–"/>
               <a:defRPr/>
@@ -11819,7 +11813,7 @@
                 <a:ea typeface="Arial"/>
                 <a:cs typeface="Arial"/>
               </a:rPr>
-              <a:t>Select all columns to include in a dataset</a:t>
+              <a:t>Provide sample queries</a:t>
             </a:r>
             <a:endParaRPr lang="fr-FR" sz="1800" b="0" i="0" u="none" strike="noStrike" cap="none" spc="0">
               <a:solidFill>
@@ -11831,7 +11825,7 @@
             </a:endParaRPr>
           </a:p>
           <a:p>
-            <a:pPr marL="283878" indent="-283878">
+            <a:pPr marL="283879" indent="-283879">
               <a:buFont typeface="Arial"/>
               <a:buChar char="–"/>
               <a:defRPr/>
@@ -11845,33 +11839,7 @@
                 <a:ea typeface="Arial"/>
                 <a:cs typeface="Arial"/>
               </a:rPr>
-              <a:t>Export the columns</a:t>
-            </a:r>
-            <a:endParaRPr lang="fr-FR" sz="1800" b="0" i="0" u="none" strike="noStrike" cap="none" spc="0">
-              <a:solidFill>
-                <a:schemeClr val="tx1"/>
-              </a:solidFill>
-              <a:latin typeface="Arial"/>
-              <a:ea typeface="Arial"/>
-              <a:cs typeface="Arial"/>
-            </a:endParaRPr>
-          </a:p>
-          <a:p>
-            <a:pPr marL="283878" indent="-283878">
-              <a:buFont typeface="Arial"/>
-              <a:buChar char="–"/>
-              <a:defRPr/>
-            </a:pPr>
-            <a:r>
-              <a:rPr lang="fr-FR" sz="1800" b="0" i="0" u="none" strike="noStrike" cap="none" spc="0">
-                <a:solidFill>
-                  <a:schemeClr val="tx1"/>
-                </a:solidFill>
-                <a:latin typeface="Arial"/>
-                <a:ea typeface="Arial"/>
-                <a:cs typeface="Arial"/>
-              </a:rPr>
-              <a:t>Combine with dashboard tool</a:t>
+              <a:t>Demonstrate the structure of the graph</a:t>
             </a:r>
             <a:endParaRPr lang="fr-FR" sz="1800" b="0" i="0" u="none" strike="noStrike" cap="none" spc="0">
               <a:solidFill>
@@ -11918,14 +11886,14 @@
       </p:grpSpPr>
       <p:sp>
         <p:nvSpPr>
-          <p:cNvPr id="1611658873" name=""/>
+          <p:cNvPr id="909589562" name=""/>
           <p:cNvSpPr txBox="1"/>
           <p:nvPr/>
         </p:nvSpPr>
         <p:spPr bwMode="auto">
           <a:xfrm flipH="0" flipV="0">
-            <a:off x="968778" y="743410"/>
-            <a:ext cx="10479336" cy="1189079"/>
+            <a:off x="968778" y="743411"/>
+            <a:ext cx="10472136" cy="2286360"/>
           </a:xfrm>
           <a:prstGeom prst="rect">
             <a:avLst/>
@@ -11949,7 +11917,7 @@
                 <a:ea typeface="Century Gothic"/>
                 <a:cs typeface="Century Gothic"/>
               </a:rPr>
-              <a:t>SPARQL learning tool</a:t>
+              <a:t>Back-office analysis tool</a:t>
             </a:r>
             <a:endParaRPr sz="7200">
               <a:latin typeface="Century Gothic"/>
@@ -11960,14 +11928,14 @@
       </p:sp>
       <p:sp>
         <p:nvSpPr>
-          <p:cNvPr id="1682206429" name=""/>
+          <p:cNvPr id="1702146303" name=""/>
           <p:cNvSpPr txBox="1"/>
           <p:nvPr/>
         </p:nvSpPr>
         <p:spPr bwMode="auto">
           <a:xfrm flipH="0" flipV="0">
             <a:off x="1082911" y="4346355"/>
-            <a:ext cx="8881152" cy="640440"/>
+            <a:ext cx="8858472" cy="914760"/>
           </a:xfrm>
           <a:prstGeom prst="rect">
             <a:avLst/>
@@ -11979,7 +11947,7 @@
             <a:spAutoFit/>
           </a:bodyPr>
           <a:p>
-            <a:pPr marL="283878" indent="-283878">
+            <a:pPr marL="283879" indent="-283879">
               <a:buFont typeface="Arial"/>
               <a:buChar char="–"/>
               <a:defRPr/>
@@ -11993,7 +11961,7 @@
                 <a:ea typeface="Arial"/>
                 <a:cs typeface="Arial"/>
               </a:rPr>
-              <a:t>Show the generated SPARQL query</a:t>
+              <a:t>Quality checks, quick reporting</a:t>
             </a:r>
             <a:endParaRPr lang="fr-FR" sz="1800" b="0" i="0" u="none" strike="noStrike" cap="none" spc="0">
               <a:solidFill>
@@ -12005,7 +11973,7 @@
             </a:endParaRPr>
           </a:p>
           <a:p>
-            <a:pPr marL="283878" indent="-283878">
+            <a:pPr marL="283879" indent="-283879">
               <a:buFont typeface="Arial"/>
               <a:buChar char="–"/>
               <a:defRPr/>
@@ -12019,7 +11987,32 @@
                 <a:ea typeface="Arial"/>
                 <a:cs typeface="Arial"/>
               </a:rPr>
-              <a:t>Use as SPARQL learning resource</a:t>
+              <a:t>Detect inconsistencies</a:t>
+            </a:r>
+            <a:endParaRPr lang="fr-FR" sz="1800" b="0" i="0" u="none" strike="noStrike" cap="none" spc="0">
+              <a:solidFill>
+                <a:schemeClr val="tx1"/>
+              </a:solidFill>
+              <a:latin typeface="Arial"/>
+              <a:cs typeface="Arial"/>
+            </a:endParaRPr>
+          </a:p>
+          <a:p>
+            <a:pPr marL="283878" indent="-283878">
+              <a:buFont typeface="Arial"/>
+              <a:buChar char="–"/>
+              <a:defRPr/>
+            </a:pPr>
+            <a:r>
+              <a:rPr lang="fr-FR" sz="1800" b="0" i="0" u="none" strike="noStrike" cap="none" spc="0">
+                <a:solidFill>
+                  <a:schemeClr val="tx1"/>
+                </a:solidFill>
+                <a:latin typeface="Arial"/>
+                <a:ea typeface="Arial"/>
+                <a:cs typeface="Arial"/>
+              </a:rPr>
+              <a:t>Use a precise config matching the graph structure</a:t>
             </a:r>
             <a:endParaRPr lang="fr-FR" sz="1800" b="0" i="0" u="none" strike="noStrike" cap="none" spc="0">
               <a:solidFill>
@@ -12048,6 +12041,353 @@
 </file>
 
 <file path=ppt/slides/slide45.xml><?xml version="1.0" encoding="utf-8"?>
+<p:sld xmlns:a="http://schemas.openxmlformats.org/drawingml/2006/main" xmlns:r="http://schemas.openxmlformats.org/officeDocument/2006/relationships" xmlns:p="http://schemas.openxmlformats.org/presentationml/2006/main" xmlns:m="http://schemas.openxmlformats.org/officeDocument/2006/math" xmlns:w="http://schemas.openxmlformats.org/wordprocessingml/2006/main" xmlns:mc="http://schemas.openxmlformats.org/markup-compatibility/2006" showMasterPhAnim="0" showMasterSp="1" show="1">
+  <p:cSld name="">
+    <p:spTree>
+      <p:nvGrpSpPr>
+        <p:cNvPr id="1" name=""/>
+        <p:cNvGrpSpPr/>
+        <p:nvPr/>
+      </p:nvGrpSpPr>
+      <p:grpSpPr bwMode="auto">
+        <a:xfrm>
+          <a:off x="0" y="0"/>
+          <a:ext cx="0" cy="0"/>
+          <a:chOff x="0" y="0"/>
+          <a:chExt cx="0" cy="0"/>
+        </a:xfrm>
+      </p:grpSpPr>
+      <p:sp>
+        <p:nvSpPr>
+          <p:cNvPr id="988142885" name=""/>
+          <p:cNvSpPr txBox="1"/>
+          <p:nvPr/>
+        </p:nvSpPr>
+        <p:spPr bwMode="auto">
+          <a:xfrm flipH="0" flipV="0">
+            <a:off x="968778" y="743411"/>
+            <a:ext cx="10444393" cy="2286360"/>
+          </a:xfrm>
+          <a:prstGeom prst="rect">
+            <a:avLst/>
+          </a:prstGeom>
+          <a:noFill/>
+        </p:spPr>
+        <p:txBody>
+          <a:bodyPr vertOverflow="overflow" horzOverflow="overflow" vert="horz" wrap="square" lIns="91440" tIns="45720" rIns="91440" bIns="45720" numCol="1" spcCol="0" rtlCol="0" fromWordArt="0" anchor="t" anchorCtr="0" forceAA="0" upright="0" compatLnSpc="0">
+            <a:spAutoFit/>
+          </a:bodyPr>
+          <a:p>
+            <a:pPr>
+              <a:defRPr/>
+            </a:pPr>
+            <a:r>
+              <a:rPr lang="fr-FR" sz="7200" b="0" i="0" u="none" strike="noStrike" cap="none" spc="0">
+                <a:solidFill>
+                  <a:schemeClr val="tx1"/>
+                </a:solidFill>
+                <a:latin typeface="Century Gothic"/>
+                <a:ea typeface="Century Gothic"/>
+                <a:cs typeface="Century Gothic"/>
+              </a:rPr>
+              <a:t>Dataset production tool</a:t>
+            </a:r>
+            <a:endParaRPr sz="7200">
+              <a:latin typeface="Century Gothic"/>
+              <a:cs typeface="Century Gothic"/>
+            </a:endParaRPr>
+          </a:p>
+        </p:txBody>
+      </p:sp>
+      <p:sp>
+        <p:nvSpPr>
+          <p:cNvPr id="646141916" name=""/>
+          <p:cNvSpPr txBox="1"/>
+          <p:nvPr/>
+        </p:nvSpPr>
+        <p:spPr bwMode="auto">
+          <a:xfrm flipH="0" flipV="0">
+            <a:off x="1082911" y="4346355"/>
+            <a:ext cx="8882232" cy="1189079"/>
+          </a:xfrm>
+          <a:prstGeom prst="rect">
+            <a:avLst/>
+          </a:prstGeom>
+          <a:noFill/>
+        </p:spPr>
+        <p:txBody>
+          <a:bodyPr vertOverflow="overflow" horzOverflow="overflow" vert="horz" wrap="square" lIns="91440" tIns="45720" rIns="91440" bIns="45720" numCol="1" spcCol="0" rtlCol="0" fromWordArt="0" anchor="t" anchorCtr="0" forceAA="0" upright="0" compatLnSpc="0">
+            <a:spAutoFit/>
+          </a:bodyPr>
+          <a:p>
+            <a:pPr marL="283879" indent="-283879">
+              <a:buFont typeface="Arial"/>
+              <a:buChar char="–"/>
+              <a:defRPr/>
+            </a:pPr>
+            <a:r>
+              <a:rPr lang="fr-FR" sz="1800" b="0" i="0" u="none" strike="noStrike" cap="none" spc="0">
+                <a:solidFill>
+                  <a:schemeClr val="tx1"/>
+                </a:solidFill>
+                <a:latin typeface="Arial"/>
+                <a:ea typeface="Arial"/>
+                <a:cs typeface="Arial"/>
+              </a:rPr>
+              <a:t>Select a subset of entities from the graph</a:t>
+            </a:r>
+            <a:endParaRPr lang="fr-FR" sz="1800" b="0" i="0" u="none" strike="noStrike" cap="none" spc="0">
+              <a:solidFill>
+                <a:schemeClr val="tx1"/>
+              </a:solidFill>
+              <a:latin typeface="Arial"/>
+              <a:cs typeface="Arial"/>
+            </a:endParaRPr>
+          </a:p>
+          <a:p>
+            <a:pPr marL="283878" indent="-283878">
+              <a:buFont typeface="Arial"/>
+              <a:buChar char="–"/>
+              <a:defRPr/>
+            </a:pPr>
+            <a:r>
+              <a:rPr lang="fr-FR" sz="1800" b="0" i="0" u="none" strike="noStrike" cap="none" spc="0">
+                <a:solidFill>
+                  <a:schemeClr val="tx1"/>
+                </a:solidFill>
+                <a:latin typeface="Arial"/>
+                <a:ea typeface="Arial"/>
+                <a:cs typeface="Arial"/>
+              </a:rPr>
+              <a:t>Select all columns to include in a dataset</a:t>
+            </a:r>
+            <a:endParaRPr lang="fr-FR" sz="1800" b="0" i="0" u="none" strike="noStrike" cap="none" spc="0">
+              <a:solidFill>
+                <a:schemeClr val="tx1"/>
+              </a:solidFill>
+              <a:latin typeface="Arial"/>
+              <a:ea typeface="Arial"/>
+              <a:cs typeface="Arial"/>
+            </a:endParaRPr>
+          </a:p>
+          <a:p>
+            <a:pPr marL="283878" indent="-283878">
+              <a:buFont typeface="Arial"/>
+              <a:buChar char="–"/>
+              <a:defRPr/>
+            </a:pPr>
+            <a:r>
+              <a:rPr lang="fr-FR" sz="1800" b="0" i="0" u="none" strike="noStrike" cap="none" spc="0">
+                <a:solidFill>
+                  <a:schemeClr val="tx1"/>
+                </a:solidFill>
+                <a:latin typeface="Arial"/>
+                <a:ea typeface="Arial"/>
+                <a:cs typeface="Arial"/>
+              </a:rPr>
+              <a:t>Export the columns</a:t>
+            </a:r>
+            <a:endParaRPr lang="fr-FR" sz="1800" b="0" i="0" u="none" strike="noStrike" cap="none" spc="0">
+              <a:solidFill>
+                <a:schemeClr val="tx1"/>
+              </a:solidFill>
+              <a:latin typeface="Arial"/>
+              <a:ea typeface="Arial"/>
+              <a:cs typeface="Arial"/>
+            </a:endParaRPr>
+          </a:p>
+          <a:p>
+            <a:pPr marL="283878" indent="-283878">
+              <a:buFont typeface="Arial"/>
+              <a:buChar char="–"/>
+              <a:defRPr/>
+            </a:pPr>
+            <a:r>
+              <a:rPr lang="fr-FR" sz="1800" b="0" i="0" u="none" strike="noStrike" cap="none" spc="0">
+                <a:solidFill>
+                  <a:schemeClr val="tx1"/>
+                </a:solidFill>
+                <a:latin typeface="Arial"/>
+                <a:ea typeface="Arial"/>
+                <a:cs typeface="Arial"/>
+              </a:rPr>
+              <a:t>Combine with dashboard tool</a:t>
+            </a:r>
+            <a:endParaRPr lang="fr-FR" sz="1800" b="0" i="0" u="none" strike="noStrike" cap="none" spc="0">
+              <a:solidFill>
+                <a:schemeClr val="tx1"/>
+              </a:solidFill>
+              <a:latin typeface="Arial"/>
+              <a:cs typeface="Arial"/>
+            </a:endParaRPr>
+          </a:p>
+        </p:txBody>
+      </p:sp>
+    </p:spTree>
+  </p:cSld>
+  <p:clrMapOvr>
+    <a:masterClrMapping/>
+  </p:clrMapOvr>
+  <mc:AlternateContent xmlns:mc="http://schemas.openxmlformats.org/markup-compatibility/2006">
+    <mc:Choice xmlns:p159="http://schemas.microsoft.com/office/powerpoint/2015/09/main" xmlns:p14="http://schemas.microsoft.com/office/powerpoint/2010/main" Requires="p159">
+      <p:transition p14:dur="2000" advClick="1"/>
+    </mc:Choice>
+    <mc:Fallback>
+      <p:transition advClick="1"/>
+    </mc:Fallback>
+  </mc:AlternateContent>
+</p:sld>
+</file>
+
+<file path=ppt/slides/slide46.xml><?xml version="1.0" encoding="utf-8"?>
+<p:sld xmlns:a="http://schemas.openxmlformats.org/drawingml/2006/main" xmlns:r="http://schemas.openxmlformats.org/officeDocument/2006/relationships" xmlns:p="http://schemas.openxmlformats.org/presentationml/2006/main" xmlns:m="http://schemas.openxmlformats.org/officeDocument/2006/math" xmlns:w="http://schemas.openxmlformats.org/wordprocessingml/2006/main" xmlns:mc="http://schemas.openxmlformats.org/markup-compatibility/2006" showMasterPhAnim="0" showMasterSp="1" show="1">
+  <p:cSld name="">
+    <p:spTree>
+      <p:nvGrpSpPr>
+        <p:cNvPr id="1" name=""/>
+        <p:cNvGrpSpPr/>
+        <p:nvPr/>
+      </p:nvGrpSpPr>
+      <p:grpSpPr bwMode="auto">
+        <a:xfrm>
+          <a:off x="0" y="0"/>
+          <a:ext cx="0" cy="0"/>
+          <a:chOff x="0" y="0"/>
+          <a:chExt cx="0" cy="0"/>
+        </a:xfrm>
+      </p:grpSpPr>
+      <p:sp>
+        <p:nvSpPr>
+          <p:cNvPr id="1611658873" name=""/>
+          <p:cNvSpPr txBox="1"/>
+          <p:nvPr/>
+        </p:nvSpPr>
+        <p:spPr bwMode="auto">
+          <a:xfrm flipH="0" flipV="0">
+            <a:off x="968778" y="743410"/>
+            <a:ext cx="10479336" cy="1189079"/>
+          </a:xfrm>
+          <a:prstGeom prst="rect">
+            <a:avLst/>
+          </a:prstGeom>
+          <a:noFill/>
+        </p:spPr>
+        <p:txBody>
+          <a:bodyPr vertOverflow="overflow" horzOverflow="overflow" vert="horz" wrap="square" lIns="91440" tIns="45720" rIns="91440" bIns="45720" numCol="1" spcCol="0" rtlCol="0" fromWordArt="0" anchor="t" anchorCtr="0" forceAA="0" upright="0" compatLnSpc="0">
+            <a:spAutoFit/>
+          </a:bodyPr>
+          <a:p>
+            <a:pPr>
+              <a:defRPr/>
+            </a:pPr>
+            <a:r>
+              <a:rPr lang="fr-FR" sz="7200" b="0" i="0" u="none" strike="noStrike" cap="none" spc="0">
+                <a:solidFill>
+                  <a:schemeClr val="tx1"/>
+                </a:solidFill>
+                <a:latin typeface="Century Gothic"/>
+                <a:ea typeface="Century Gothic"/>
+                <a:cs typeface="Century Gothic"/>
+              </a:rPr>
+              <a:t>SPARQL learning tool</a:t>
+            </a:r>
+            <a:endParaRPr sz="7200">
+              <a:latin typeface="Century Gothic"/>
+              <a:cs typeface="Century Gothic"/>
+            </a:endParaRPr>
+          </a:p>
+        </p:txBody>
+      </p:sp>
+      <p:sp>
+        <p:nvSpPr>
+          <p:cNvPr id="1682206429" name=""/>
+          <p:cNvSpPr txBox="1"/>
+          <p:nvPr/>
+        </p:nvSpPr>
+        <p:spPr bwMode="auto">
+          <a:xfrm flipH="0" flipV="0">
+            <a:off x="1082911" y="4346355"/>
+            <a:ext cx="8881152" cy="640440"/>
+          </a:xfrm>
+          <a:prstGeom prst="rect">
+            <a:avLst/>
+          </a:prstGeom>
+          <a:noFill/>
+        </p:spPr>
+        <p:txBody>
+          <a:bodyPr vertOverflow="overflow" horzOverflow="overflow" vert="horz" wrap="square" lIns="91440" tIns="45720" rIns="91440" bIns="45720" numCol="1" spcCol="0" rtlCol="0" fromWordArt="0" anchor="t" anchorCtr="0" forceAA="0" upright="0" compatLnSpc="0">
+            <a:spAutoFit/>
+          </a:bodyPr>
+          <a:p>
+            <a:pPr marL="283878" indent="-283878">
+              <a:buFont typeface="Arial"/>
+              <a:buChar char="–"/>
+              <a:defRPr/>
+            </a:pPr>
+            <a:r>
+              <a:rPr lang="fr-FR" sz="1800" b="0" i="0" u="none" strike="noStrike" cap="none" spc="0">
+                <a:solidFill>
+                  <a:schemeClr val="tx1"/>
+                </a:solidFill>
+                <a:latin typeface="Arial"/>
+                <a:ea typeface="Arial"/>
+                <a:cs typeface="Arial"/>
+              </a:rPr>
+              <a:t>Show the generated SPARQL query</a:t>
+            </a:r>
+            <a:endParaRPr lang="fr-FR" sz="1800" b="0" i="0" u="none" strike="noStrike" cap="none" spc="0">
+              <a:solidFill>
+                <a:schemeClr val="tx1"/>
+              </a:solidFill>
+              <a:latin typeface="Arial"/>
+              <a:ea typeface="Arial"/>
+              <a:cs typeface="Arial"/>
+            </a:endParaRPr>
+          </a:p>
+          <a:p>
+            <a:pPr marL="283878" indent="-283878">
+              <a:buFont typeface="Arial"/>
+              <a:buChar char="–"/>
+              <a:defRPr/>
+            </a:pPr>
+            <a:r>
+              <a:rPr lang="fr-FR" sz="1800" b="0" i="0" u="none" strike="noStrike" cap="none" spc="0">
+                <a:solidFill>
+                  <a:schemeClr val="tx1"/>
+                </a:solidFill>
+                <a:latin typeface="Arial"/>
+                <a:ea typeface="Arial"/>
+                <a:cs typeface="Arial"/>
+              </a:rPr>
+              <a:t>Use as SPARQL learning resource</a:t>
+            </a:r>
+            <a:endParaRPr lang="fr-FR" sz="1800" b="0" i="0" u="none" strike="noStrike" cap="none" spc="0">
+              <a:solidFill>
+                <a:schemeClr val="tx1"/>
+              </a:solidFill>
+              <a:latin typeface="Arial"/>
+              <a:cs typeface="Arial"/>
+            </a:endParaRPr>
+          </a:p>
+        </p:txBody>
+      </p:sp>
+    </p:spTree>
+  </p:cSld>
+  <p:clrMapOvr>
+    <a:masterClrMapping/>
+  </p:clrMapOvr>
+  <mc:AlternateContent xmlns:mc="http://schemas.openxmlformats.org/markup-compatibility/2006">
+    <mc:Choice xmlns:p159="http://schemas.microsoft.com/office/powerpoint/2015/09/main" xmlns:p14="http://schemas.microsoft.com/office/powerpoint/2010/main" Requires="p159">
+      <p:transition p14:dur="2000" advClick="1"/>
+    </mc:Choice>
+    <mc:Fallback>
+      <p:transition advClick="1"/>
+    </mc:Fallback>
+  </mc:AlternateContent>
+</p:sld>
+</file>
+
+<file path=ppt/slides/slide47.xml><?xml version="1.0" encoding="utf-8"?>
 <p:sld xmlns:a="http://schemas.openxmlformats.org/drawingml/2006/main" xmlns:r="http://schemas.openxmlformats.org/officeDocument/2006/relationships" xmlns:p="http://schemas.openxmlformats.org/presentationml/2006/main" xmlns:m="http://schemas.openxmlformats.org/officeDocument/2006/math" xmlns:w="http://schemas.openxmlformats.org/wordprocessingml/2006/main" xmlns:mc="http://schemas.openxmlformats.org/markup-compatibility/2006" showMasterPhAnim="0" showMasterSp="1" show="1">
   <p:cSld name="">
     <p:spTree>
@@ -12240,208 +12580,6 @@
 </p:sld>
 </file>
 
-<file path=ppt/slides/slide46.xml><?xml version="1.0" encoding="utf-8"?>
-<p:sld xmlns:a="http://schemas.openxmlformats.org/drawingml/2006/main" xmlns:r="http://schemas.openxmlformats.org/officeDocument/2006/relationships" xmlns:p="http://schemas.openxmlformats.org/presentationml/2006/main" xmlns:m="http://schemas.openxmlformats.org/officeDocument/2006/math" xmlns:w="http://schemas.openxmlformats.org/wordprocessingml/2006/main" xmlns:mc="http://schemas.openxmlformats.org/markup-compatibility/2006" showMasterPhAnim="0" showMasterSp="1" show="1">
-  <p:cSld name="">
-    <p:spTree>
-      <p:nvGrpSpPr>
-        <p:cNvPr id="1" name=""/>
-        <p:cNvGrpSpPr/>
-        <p:nvPr/>
-      </p:nvGrpSpPr>
-      <p:grpSpPr bwMode="auto">
-        <a:xfrm>
-          <a:off x="0" y="0"/>
-          <a:ext cx="0" cy="0"/>
-          <a:chOff x="0" y="0"/>
-          <a:chExt cx="0" cy="0"/>
-        </a:xfrm>
-      </p:grpSpPr>
-      <p:sp>
-        <p:nvSpPr>
-          <p:cNvPr id="1857178803" name=""/>
-          <p:cNvSpPr txBox="1"/>
-          <p:nvPr/>
-        </p:nvSpPr>
-        <p:spPr bwMode="auto">
-          <a:xfrm flipH="0" flipV="0">
-            <a:off x="213639" y="5345093"/>
-            <a:ext cx="2363171" cy="1463400"/>
-          </a:xfrm>
-          <a:prstGeom prst="rect">
-            <a:avLst/>
-          </a:prstGeom>
-          <a:noFill/>
-        </p:spPr>
-        <p:txBody>
-          <a:bodyPr vertOverflow="overflow" horzOverflow="overflow" vert="horz" wrap="square" lIns="91440" tIns="45720" rIns="91440" bIns="45720" numCol="1" spcCol="0" rtlCol="0" fromWordArt="0" anchor="t" anchorCtr="0" forceAA="0" upright="0" compatLnSpc="0">
-            <a:spAutoFit/>
-          </a:bodyPr>
-          <a:p>
-            <a:pPr>
-              <a:defRPr/>
-            </a:pPr>
-            <a:r>
-              <a:rPr lang="fr-FR" sz="1800" b="0" i="1" u="none" strike="noStrike" cap="none" spc="0">
-                <a:solidFill>
-                  <a:schemeClr val="tx1"/>
-                </a:solidFill>
-                <a:latin typeface="Arial"/>
-                <a:ea typeface="Arial"/>
-                <a:cs typeface="Arial"/>
-              </a:rPr>
-              <a:t>« All chairmans of EU political groups, with their dates of membership and picture »</a:t>
-            </a:r>
-            <a:endParaRPr sz="1800" b="0" i="1" u="none" strike="noStrike" cap="none" spc="0">
-              <a:solidFill>
-                <a:schemeClr val="tx1"/>
-              </a:solidFill>
-              <a:latin typeface="Arial"/>
-              <a:ea typeface="Arial"/>
-              <a:cs typeface="Arial"/>
-            </a:endParaRPr>
-          </a:p>
-        </p:txBody>
-      </p:sp>
-      <p:pic>
-        <p:nvPicPr>
-          <p:cNvPr id="609941172" name=""/>
-          <p:cNvPicPr>
-            <a:picLocks noChangeAspect="1"/>
-          </p:cNvPicPr>
-          <p:nvPr/>
-        </p:nvPicPr>
-        <p:blipFill>
-          <a:blip r:embed="rId3"/>
-          <a:stretch/>
-        </p:blipFill>
-        <p:spPr bwMode="auto">
-          <a:xfrm flipH="0" flipV="0">
-            <a:off x="2819188" y="110970"/>
-            <a:ext cx="9312702" cy="6518891"/>
-          </a:xfrm>
-          <a:prstGeom prst="rect">
-            <a:avLst/>
-          </a:prstGeom>
-        </p:spPr>
-      </p:pic>
-    </p:spTree>
-  </p:cSld>
-  <p:clrMapOvr>
-    <a:masterClrMapping/>
-  </p:clrMapOvr>
-  <mc:AlternateContent xmlns:mc="http://schemas.openxmlformats.org/markup-compatibility/2006">
-    <mc:Choice xmlns:p159="http://schemas.microsoft.com/office/powerpoint/2015/09/main" xmlns:p14="http://schemas.microsoft.com/office/powerpoint/2010/main" Requires="p159">
-      <p:transition p14:dur="2000" advClick="1"/>
-    </mc:Choice>
-    <mc:Fallback>
-      <p:transition advClick="1"/>
-    </mc:Fallback>
-  </mc:AlternateContent>
-</p:sld>
-</file>
-
-<file path=ppt/slides/slide47.xml><?xml version="1.0" encoding="utf-8"?>
-<p:sld xmlns:a="http://schemas.openxmlformats.org/drawingml/2006/main" xmlns:r="http://schemas.openxmlformats.org/officeDocument/2006/relationships" xmlns:p="http://schemas.openxmlformats.org/presentationml/2006/main" xmlns:m="http://schemas.openxmlformats.org/officeDocument/2006/math" xmlns:w="http://schemas.openxmlformats.org/wordprocessingml/2006/main" xmlns:mc="http://schemas.openxmlformats.org/markup-compatibility/2006" showMasterPhAnim="0" showMasterSp="1" show="1">
-  <p:cSld name="">
-    <p:spTree>
-      <p:nvGrpSpPr>
-        <p:cNvPr id="1" name=""/>
-        <p:cNvGrpSpPr/>
-        <p:nvPr/>
-      </p:nvGrpSpPr>
-      <p:grpSpPr bwMode="auto">
-        <a:xfrm>
-          <a:off x="0" y="0"/>
-          <a:ext cx="0" cy="0"/>
-          <a:chOff x="0" y="0"/>
-          <a:chExt cx="0" cy="0"/>
-        </a:xfrm>
-      </p:grpSpPr>
-      <p:sp>
-        <p:nvSpPr>
-          <p:cNvPr id="1907983415" name=""/>
-          <p:cNvSpPr txBox="1"/>
-          <p:nvPr/>
-        </p:nvSpPr>
-        <p:spPr bwMode="auto">
-          <a:xfrm flipH="0" flipV="0">
-            <a:off x="213639" y="5345092"/>
-            <a:ext cx="2363171" cy="1463400"/>
-          </a:xfrm>
-          <a:prstGeom prst="rect">
-            <a:avLst/>
-          </a:prstGeom>
-          <a:noFill/>
-        </p:spPr>
-        <p:txBody>
-          <a:bodyPr vertOverflow="overflow" horzOverflow="overflow" vert="horz" wrap="square" lIns="91440" tIns="45720" rIns="91440" bIns="45720" numCol="1" spcCol="0" rtlCol="0" fromWordArt="0" anchor="t" anchorCtr="0" forceAA="0" upright="0" compatLnSpc="0">
-            <a:spAutoFit/>
-          </a:bodyPr>
-          <a:p>
-            <a:pPr>
-              <a:defRPr/>
-            </a:pPr>
-            <a:r>
-              <a:rPr lang="fr-FR" sz="1800" b="0" i="1" u="none" strike="noStrike" cap="none" spc="0">
-                <a:solidFill>
-                  <a:schemeClr val="tx1"/>
-                </a:solidFill>
-                <a:latin typeface="Arial"/>
-                <a:ea typeface="Arial"/>
-                <a:cs typeface="Arial"/>
-              </a:rPr>
-              <a:t>« All chairmans of EU political groups, with their dates of membership and picture »</a:t>
-            </a:r>
-            <a:endParaRPr sz="1800" b="0" i="1" u="none" strike="noStrike" cap="none" spc="0">
-              <a:solidFill>
-                <a:schemeClr val="tx1"/>
-              </a:solidFill>
-              <a:latin typeface="Arial"/>
-              <a:ea typeface="Arial"/>
-              <a:cs typeface="Arial"/>
-            </a:endParaRPr>
-          </a:p>
-        </p:txBody>
-      </p:sp>
-      <p:pic>
-        <p:nvPicPr>
-          <p:cNvPr id="2097549827" name=""/>
-          <p:cNvPicPr>
-            <a:picLocks noChangeAspect="1"/>
-          </p:cNvPicPr>
-          <p:nvPr/>
-        </p:nvPicPr>
-        <p:blipFill>
-          <a:blip r:embed="rId3"/>
-          <a:stretch/>
-        </p:blipFill>
-        <p:spPr bwMode="auto">
-          <a:xfrm flipH="0" flipV="0">
-            <a:off x="3261720" y="351407"/>
-            <a:ext cx="8594684" cy="5605508"/>
-          </a:xfrm>
-          <a:prstGeom prst="rect">
-            <a:avLst/>
-          </a:prstGeom>
-        </p:spPr>
-      </p:pic>
-    </p:spTree>
-  </p:cSld>
-  <p:clrMapOvr>
-    <a:masterClrMapping/>
-  </p:clrMapOvr>
-  <mc:AlternateContent xmlns:mc="http://schemas.openxmlformats.org/markup-compatibility/2006">
-    <mc:Choice xmlns:p159="http://schemas.microsoft.com/office/powerpoint/2015/09/main" xmlns:p14="http://schemas.microsoft.com/office/powerpoint/2010/main" Requires="p159">
-      <p:transition p14:dur="2000" advClick="1"/>
-    </mc:Choice>
-    <mc:Fallback>
-      <p:transition advClick="1"/>
-    </mc:Fallback>
-  </mc:AlternateContent>
-</p:sld>
-</file>
-
 <file path=ppt/slides/slide48.xml><?xml version="1.0" encoding="utf-8"?>
 <p:sld xmlns:a="http://schemas.openxmlformats.org/drawingml/2006/main" xmlns:r="http://schemas.openxmlformats.org/officeDocument/2006/relationships" xmlns:p="http://schemas.openxmlformats.org/presentationml/2006/main" xmlns:m="http://schemas.openxmlformats.org/officeDocument/2006/math" xmlns:w="http://schemas.openxmlformats.org/wordprocessingml/2006/main" xmlns:mc="http://schemas.openxmlformats.org/markup-compatibility/2006" showMasterPhAnim="0" showMasterSp="1" show="1">
   <p:cSld name="">
@@ -12461,14 +12599,14 @@
       </p:grpSpPr>
       <p:sp>
         <p:nvSpPr>
-          <p:cNvPr id="1972975811" name=""/>
+          <p:cNvPr id="1857178803" name=""/>
           <p:cNvSpPr txBox="1"/>
           <p:nvPr/>
         </p:nvSpPr>
         <p:spPr bwMode="auto">
           <a:xfrm flipH="0" flipV="0">
-            <a:off x="65678" y="5872204"/>
-            <a:ext cx="2893384" cy="640440"/>
+            <a:off x="213639" y="5345093"/>
+            <a:ext cx="2363171" cy="1463400"/>
           </a:xfrm>
           <a:prstGeom prst="rect">
             <a:avLst/>
@@ -12492,7 +12630,7 @@
                 <a:ea typeface="Arial"/>
                 <a:cs typeface="Arial"/>
               </a:rPr>
-              <a:t>« Votes and Debates per parliamentary sitting »</a:t>
+              <a:t>« All chairmans of EU political groups, with their dates of membership and picture »</a:t>
             </a:r>
             <a:endParaRPr sz="1800" b="0" i="1" u="none" strike="noStrike" cap="none" spc="0">
               <a:solidFill>
@@ -12507,7 +12645,7 @@
       </p:sp>
       <p:pic>
         <p:nvPicPr>
-          <p:cNvPr id="531431446" name=""/>
+          <p:cNvPr id="609941172" name=""/>
           <p:cNvPicPr>
             <a:picLocks noChangeAspect="1"/>
           </p:cNvPicPr>
@@ -12519,8 +12657,8 @@
         </p:blipFill>
         <p:spPr bwMode="auto">
           <a:xfrm flipH="0" flipV="0">
-            <a:off x="3261860" y="166548"/>
-            <a:ext cx="8834426" cy="6524902"/>
+            <a:off x="2819188" y="110970"/>
+            <a:ext cx="9312702" cy="6518891"/>
           </a:xfrm>
           <a:prstGeom prst="rect">
             <a:avLst/>
@@ -12562,14 +12700,14 @@
       </p:grpSpPr>
       <p:sp>
         <p:nvSpPr>
-          <p:cNvPr id="547983875" name=""/>
+          <p:cNvPr id="1907983415" name=""/>
           <p:cNvSpPr txBox="1"/>
           <p:nvPr/>
         </p:nvSpPr>
         <p:spPr bwMode="auto">
           <a:xfrm flipH="0" flipV="0">
-            <a:off x="65677" y="5502300"/>
-            <a:ext cx="2924703" cy="1189079"/>
+            <a:off x="213639" y="5345092"/>
+            <a:ext cx="2363171" cy="1463400"/>
           </a:xfrm>
           <a:prstGeom prst="rect">
             <a:avLst/>
@@ -12593,7 +12731,7 @@
                 <a:ea typeface="Arial"/>
                 <a:cs typeface="Arial"/>
               </a:rPr>
-              <a:t>« How many documents were voted during a plenary sitting in 2022 ? » (not sure)</a:t>
+              <a:t>« All chairmans of EU political groups, with their dates of membership and picture »</a:t>
             </a:r>
             <a:endParaRPr sz="1800" b="0" i="1" u="none" strike="noStrike" cap="none" spc="0">
               <a:solidFill>
@@ -12608,7 +12746,7 @@
       </p:sp>
       <p:pic>
         <p:nvPicPr>
-          <p:cNvPr id="170913294" name=""/>
+          <p:cNvPr id="2097549827" name=""/>
           <p:cNvPicPr>
             <a:picLocks noChangeAspect="1"/>
           </p:cNvPicPr>
@@ -12620,8 +12758,8 @@
         </p:blipFill>
         <p:spPr bwMode="auto">
           <a:xfrm flipH="0" flipV="0">
-            <a:off x="2982821" y="277427"/>
-            <a:ext cx="8983005" cy="5206753"/>
+            <a:off x="3261720" y="351407"/>
+            <a:ext cx="8594684" cy="5605508"/>
           </a:xfrm>
           <a:prstGeom prst="rect">
             <a:avLst/>
@@ -12769,6 +12907,208 @@
           </a:p>
         </p:txBody>
       </p:sp>
+    </p:spTree>
+  </p:cSld>
+  <p:clrMapOvr>
+    <a:masterClrMapping/>
+  </p:clrMapOvr>
+  <mc:AlternateContent xmlns:mc="http://schemas.openxmlformats.org/markup-compatibility/2006">
+    <mc:Choice xmlns:p159="http://schemas.microsoft.com/office/powerpoint/2015/09/main" xmlns:p14="http://schemas.microsoft.com/office/powerpoint/2010/main" Requires="p159">
+      <p:transition p14:dur="2000" advClick="1"/>
+    </mc:Choice>
+    <mc:Fallback>
+      <p:transition advClick="1"/>
+    </mc:Fallback>
+  </mc:AlternateContent>
+</p:sld>
+</file>
+
+<file path=ppt/slides/slide50.xml><?xml version="1.0" encoding="utf-8"?>
+<p:sld xmlns:a="http://schemas.openxmlformats.org/drawingml/2006/main" xmlns:r="http://schemas.openxmlformats.org/officeDocument/2006/relationships" xmlns:p="http://schemas.openxmlformats.org/presentationml/2006/main" xmlns:m="http://schemas.openxmlformats.org/officeDocument/2006/math" xmlns:w="http://schemas.openxmlformats.org/wordprocessingml/2006/main" xmlns:mc="http://schemas.openxmlformats.org/markup-compatibility/2006" showMasterPhAnim="0" showMasterSp="1" show="1">
+  <p:cSld name="">
+    <p:spTree>
+      <p:nvGrpSpPr>
+        <p:cNvPr id="1" name=""/>
+        <p:cNvGrpSpPr/>
+        <p:nvPr/>
+      </p:nvGrpSpPr>
+      <p:grpSpPr bwMode="auto">
+        <a:xfrm>
+          <a:off x="0" y="0"/>
+          <a:ext cx="0" cy="0"/>
+          <a:chOff x="0" y="0"/>
+          <a:chExt cx="0" cy="0"/>
+        </a:xfrm>
+      </p:grpSpPr>
+      <p:sp>
+        <p:nvSpPr>
+          <p:cNvPr id="1972975811" name=""/>
+          <p:cNvSpPr txBox="1"/>
+          <p:nvPr/>
+        </p:nvSpPr>
+        <p:spPr bwMode="auto">
+          <a:xfrm flipH="0" flipV="0">
+            <a:off x="65678" y="5872204"/>
+            <a:ext cx="2893384" cy="640440"/>
+          </a:xfrm>
+          <a:prstGeom prst="rect">
+            <a:avLst/>
+          </a:prstGeom>
+          <a:noFill/>
+        </p:spPr>
+        <p:txBody>
+          <a:bodyPr vertOverflow="overflow" horzOverflow="overflow" vert="horz" wrap="square" lIns="91440" tIns="45720" rIns="91440" bIns="45720" numCol="1" spcCol="0" rtlCol="0" fromWordArt="0" anchor="t" anchorCtr="0" forceAA="0" upright="0" compatLnSpc="0">
+            <a:spAutoFit/>
+          </a:bodyPr>
+          <a:p>
+            <a:pPr>
+              <a:defRPr/>
+            </a:pPr>
+            <a:r>
+              <a:rPr lang="fr-FR" sz="1800" b="0" i="1" u="none" strike="noStrike" cap="none" spc="0">
+                <a:solidFill>
+                  <a:schemeClr val="tx1"/>
+                </a:solidFill>
+                <a:latin typeface="Arial"/>
+                <a:ea typeface="Arial"/>
+                <a:cs typeface="Arial"/>
+              </a:rPr>
+              <a:t>« Votes and Debates per parliamentary sitting »</a:t>
+            </a:r>
+            <a:endParaRPr sz="1800" b="0" i="1" u="none" strike="noStrike" cap="none" spc="0">
+              <a:solidFill>
+                <a:schemeClr val="tx1"/>
+              </a:solidFill>
+              <a:latin typeface="Arial"/>
+              <a:ea typeface="Arial"/>
+              <a:cs typeface="Arial"/>
+            </a:endParaRPr>
+          </a:p>
+        </p:txBody>
+      </p:sp>
+      <p:pic>
+        <p:nvPicPr>
+          <p:cNvPr id="531431446" name=""/>
+          <p:cNvPicPr>
+            <a:picLocks noChangeAspect="1"/>
+          </p:cNvPicPr>
+          <p:nvPr/>
+        </p:nvPicPr>
+        <p:blipFill>
+          <a:blip r:embed="rId3"/>
+          <a:stretch/>
+        </p:blipFill>
+        <p:spPr bwMode="auto">
+          <a:xfrm flipH="0" flipV="0">
+            <a:off x="3261860" y="166548"/>
+            <a:ext cx="8834426" cy="6524902"/>
+          </a:xfrm>
+          <a:prstGeom prst="rect">
+            <a:avLst/>
+          </a:prstGeom>
+        </p:spPr>
+      </p:pic>
+    </p:spTree>
+  </p:cSld>
+  <p:clrMapOvr>
+    <a:masterClrMapping/>
+  </p:clrMapOvr>
+  <mc:AlternateContent xmlns:mc="http://schemas.openxmlformats.org/markup-compatibility/2006">
+    <mc:Choice xmlns:p159="http://schemas.microsoft.com/office/powerpoint/2015/09/main" xmlns:p14="http://schemas.microsoft.com/office/powerpoint/2010/main" Requires="p159">
+      <p:transition p14:dur="2000" advClick="1"/>
+    </mc:Choice>
+    <mc:Fallback>
+      <p:transition advClick="1"/>
+    </mc:Fallback>
+  </mc:AlternateContent>
+</p:sld>
+</file>
+
+<file path=ppt/slides/slide51.xml><?xml version="1.0" encoding="utf-8"?>
+<p:sld xmlns:a="http://schemas.openxmlformats.org/drawingml/2006/main" xmlns:r="http://schemas.openxmlformats.org/officeDocument/2006/relationships" xmlns:p="http://schemas.openxmlformats.org/presentationml/2006/main" xmlns:m="http://schemas.openxmlformats.org/officeDocument/2006/math" xmlns:w="http://schemas.openxmlformats.org/wordprocessingml/2006/main" xmlns:mc="http://schemas.openxmlformats.org/markup-compatibility/2006" showMasterPhAnim="0" showMasterSp="1" show="1">
+  <p:cSld name="">
+    <p:spTree>
+      <p:nvGrpSpPr>
+        <p:cNvPr id="1" name=""/>
+        <p:cNvGrpSpPr/>
+        <p:nvPr/>
+      </p:nvGrpSpPr>
+      <p:grpSpPr bwMode="auto">
+        <a:xfrm>
+          <a:off x="0" y="0"/>
+          <a:ext cx="0" cy="0"/>
+          <a:chOff x="0" y="0"/>
+          <a:chExt cx="0" cy="0"/>
+        </a:xfrm>
+      </p:grpSpPr>
+      <p:sp>
+        <p:nvSpPr>
+          <p:cNvPr id="547983875" name=""/>
+          <p:cNvSpPr txBox="1"/>
+          <p:nvPr/>
+        </p:nvSpPr>
+        <p:spPr bwMode="auto">
+          <a:xfrm flipH="0" flipV="0">
+            <a:off x="65677" y="5502300"/>
+            <a:ext cx="2924703" cy="1189079"/>
+          </a:xfrm>
+          <a:prstGeom prst="rect">
+            <a:avLst/>
+          </a:prstGeom>
+          <a:noFill/>
+        </p:spPr>
+        <p:txBody>
+          <a:bodyPr vertOverflow="overflow" horzOverflow="overflow" vert="horz" wrap="square" lIns="91440" tIns="45720" rIns="91440" bIns="45720" numCol="1" spcCol="0" rtlCol="0" fromWordArt="0" anchor="t" anchorCtr="0" forceAA="0" upright="0" compatLnSpc="0">
+            <a:spAutoFit/>
+          </a:bodyPr>
+          <a:p>
+            <a:pPr>
+              <a:defRPr/>
+            </a:pPr>
+            <a:r>
+              <a:rPr lang="fr-FR" sz="1800" b="0" i="1" u="none" strike="noStrike" cap="none" spc="0">
+                <a:solidFill>
+                  <a:schemeClr val="tx1"/>
+                </a:solidFill>
+                <a:latin typeface="Arial"/>
+                <a:ea typeface="Arial"/>
+                <a:cs typeface="Arial"/>
+              </a:rPr>
+              <a:t>« How many documents were voted during a plenary sitting in 2022 ? » (not sure)</a:t>
+            </a:r>
+            <a:endParaRPr sz="1800" b="0" i="1" u="none" strike="noStrike" cap="none" spc="0">
+              <a:solidFill>
+                <a:schemeClr val="tx1"/>
+              </a:solidFill>
+              <a:latin typeface="Arial"/>
+              <a:ea typeface="Arial"/>
+              <a:cs typeface="Arial"/>
+            </a:endParaRPr>
+          </a:p>
+        </p:txBody>
+      </p:sp>
+      <p:pic>
+        <p:nvPicPr>
+          <p:cNvPr id="170913294" name=""/>
+          <p:cNvPicPr>
+            <a:picLocks noChangeAspect="1"/>
+          </p:cNvPicPr>
+          <p:nvPr/>
+        </p:nvPicPr>
+        <p:blipFill>
+          <a:blip r:embed="rId3"/>
+          <a:stretch/>
+        </p:blipFill>
+        <p:spPr bwMode="auto">
+          <a:xfrm flipH="0" flipV="0">
+            <a:off x="2982821" y="277427"/>
+            <a:ext cx="8983005" cy="5206753"/>
+          </a:xfrm>
+          <a:prstGeom prst="rect">
+            <a:avLst/>
+          </a:prstGeom>
+        </p:spPr>
+      </p:pic>
     </p:spTree>
   </p:cSld>
   <p:clrMapOvr>

</xml_diff>